<commit_message>
Fixed bug of wdi denormalization
</commit_message>
<xml_diff>
--- a/presentations/integration.pptx
+++ b/presentations/integration.pptx
@@ -13265,8 +13265,20 @@
           </a:p>
           <a:p>
             <a:r>
+              <a:rPr lang="en-US" dirty="0" err="1"/>
+              <a:t>Falsche</a:t>
+            </a:r>
+            <a:r>
               <a:rPr lang="en-US" dirty="0"/>
               <a:t> </a:t>
+            </a:r>
+            <a:r>
+              <a:rPr lang="en-US" dirty="0" err="1"/>
+              <a:t>Annahmen</a:t>
+            </a:r>
+            <a:r>
+              <a:rPr lang="en-US" dirty="0"/>
+              <a:t>: </a:t>
             </a:r>
           </a:p>
         </p:txBody>
@@ -13358,6 +13370,36 @@
           </a:p>
         </p:txBody>
       </p:sp>
+      <p:pic>
+        <p:nvPicPr>
+          <p:cNvPr id="4" name="Grafik 3">
+            <a:extLst>
+              <a:ext uri="{FF2B5EF4-FFF2-40B4-BE49-F238E27FC236}">
+                <a16:creationId xmlns:a16="http://schemas.microsoft.com/office/drawing/2014/main" id="{03B4D40F-FC9C-4CC5-8512-DA87FD8F430E}"/>
+              </a:ext>
+            </a:extLst>
+          </p:cNvPr>
+          <p:cNvPicPr>
+            <a:picLocks noChangeAspect="1"/>
+          </p:cNvPicPr>
+          <p:nvPr/>
+        </p:nvPicPr>
+        <p:blipFill>
+          <a:blip r:embed="rId3"/>
+          <a:stretch>
+            <a:fillRect/>
+          </a:stretch>
+        </p:blipFill>
+        <p:spPr>
+          <a:xfrm>
+            <a:off x="251520" y="2139702"/>
+            <a:ext cx="5481807" cy="2169325"/>
+          </a:xfrm>
+          <a:prstGeom prst="rect">
+            <a:avLst/>
+          </a:prstGeom>
+        </p:spPr>
+      </p:pic>
     </p:spTree>
     <p:extLst>
       <p:ext uri="{BB962C8B-B14F-4D97-AF65-F5344CB8AC3E}">

</xml_diff>

<commit_message>
added images for presentation
</commit_message>
<xml_diff>
--- a/presentations/integration.pptx
+++ b/presentations/integration.pptx
@@ -13392,8 +13392,8 @@
         </p:blipFill>
         <p:spPr>
           <a:xfrm>
-            <a:off x="251520" y="2139702"/>
-            <a:ext cx="5481807" cy="2169325"/>
+            <a:off x="179386" y="1977401"/>
+            <a:ext cx="7217222" cy="2856084"/>
           </a:xfrm>
           <a:prstGeom prst="rect">
             <a:avLst/>

</xml_diff>

<commit_message>
Fixed bugs in integration code, updated presentation
</commit_message>
<xml_diff>
--- a/presentations/integration.pptx
+++ b/presentations/integration.pptx
@@ -5,10 +5,10 @@
     <p:sldMasterId id="2147483648" r:id="rId1"/>
   </p:sldMasterIdLst>
   <p:notesMasterIdLst>
-    <p:notesMasterId r:id="rId11"/>
+    <p:notesMasterId r:id="rId18"/>
   </p:notesMasterIdLst>
   <p:handoutMasterIdLst>
-    <p:handoutMasterId r:id="rId12"/>
+    <p:handoutMasterId r:id="rId19"/>
   </p:handoutMasterIdLst>
   <p:sldIdLst>
     <p:sldId id="258" r:id="rId2"/>
@@ -16,15 +16,22 @@
     <p:sldId id="260" r:id="rId4"/>
     <p:sldId id="273" r:id="rId5"/>
     <p:sldId id="274" r:id="rId6"/>
-    <p:sldId id="272" r:id="rId7"/>
-    <p:sldId id="275" r:id="rId8"/>
-    <p:sldId id="276" r:id="rId9"/>
-    <p:sldId id="263" r:id="rId10"/>
+    <p:sldId id="283" r:id="rId7"/>
+    <p:sldId id="279" r:id="rId8"/>
+    <p:sldId id="277" r:id="rId9"/>
+    <p:sldId id="278" r:id="rId10"/>
+    <p:sldId id="272" r:id="rId11"/>
+    <p:sldId id="280" r:id="rId12"/>
+    <p:sldId id="281" r:id="rId13"/>
+    <p:sldId id="282" r:id="rId14"/>
+    <p:sldId id="275" r:id="rId15"/>
+    <p:sldId id="276" r:id="rId16"/>
+    <p:sldId id="263" r:id="rId17"/>
   </p:sldIdLst>
   <p:sldSz cx="9144000" cy="5143500" type="screen16x9"/>
   <p:notesSz cx="6858000" cy="9144000"/>
   <p:custDataLst>
-    <p:tags r:id="rId13"/>
+    <p:tags r:id="rId20"/>
   </p:custDataLst>
   <p:defaultTextStyle>
     <a:defPPr>
@@ -264,6 +271,18 @@
 </p:presentation>
 </file>
 
+<file path=ppt/commentAuthors.xml><?xml version="1.0" encoding="utf-8"?>
+<p:cmAuthorLst xmlns:a="http://schemas.openxmlformats.org/drawingml/2006/main" xmlns:r="http://schemas.openxmlformats.org/officeDocument/2006/relationships" xmlns:p="http://schemas.openxmlformats.org/presentationml/2006/main">
+  <p:cmAuthor id="1" name="Johannes Hötter" initials="JH" lastIdx="2" clrIdx="0">
+    <p:extLst>
+      <p:ext uri="{19B8F6BF-5375-455C-9EA6-DF929625EA0E}">
+        <p15:presenceInfo xmlns:p15="http://schemas.microsoft.com/office/powerpoint/2012/main" userId="7d1943bb440bbc47" providerId="Windows Live"/>
+      </p:ext>
+    </p:extLst>
+  </p:cmAuthor>
+</p:cmAuthorLst>
+</file>
+
 <file path=ppt/handoutMasters/handoutMaster1.xml><?xml version="1.0" encoding="utf-8"?>
 <p:handoutMaster xmlns:a="http://schemas.openxmlformats.org/drawingml/2006/main" xmlns:r="http://schemas.openxmlformats.org/officeDocument/2006/relationships" xmlns:p="http://schemas.openxmlformats.org/presentationml/2006/main">
   <p:cSld>
@@ -351,7 +370,7 @@
             <a:fld id="{AA592FF2-A4BD-4E98-AC76-A10007E04C10}" type="datetimeFigureOut">
               <a:rPr lang="en-US" smtClean="0"/>
               <a:pPr/>
-              <a:t>12/1/2019</a:t>
+              <a:t>12/2/2019</a:t>
             </a:fld>
             <a:endParaRPr lang="en-US" dirty="0"/>
           </a:p>
@@ -1208,7 +1227,7 @@
             <a:fld id="{AA592FF2-A4BD-4E98-AC76-A10007E04C10}" type="datetimeFigureOut">
               <a:rPr lang="en-US" smtClean="0"/>
               <a:pPr/>
-              <a:t>12/1/2019</a:t>
+              <a:t>12/2/2019</a:t>
             </a:fld>
             <a:endParaRPr lang="en-US" dirty="0"/>
           </a:p>
@@ -3126,7 +3145,7 @@
             <a:fld id="{4CBF50E3-ED67-46F2-ABFC-A36EE1082CF7}" type="slidenum">
               <a:rPr lang="en-US" b="1" smtClean="0"/>
               <a:pPr/>
-              <a:t>7</a:t>
+              <a:t>14</a:t>
             </a:fld>
             <a:endParaRPr lang="en-US" b="1" dirty="0"/>
           </a:p>
@@ -3220,7 +3239,7 @@
             <a:fld id="{4CBF50E3-ED67-46F2-ABFC-A36EE1082CF7}" type="slidenum">
               <a:rPr lang="en-US" b="1" smtClean="0"/>
               <a:pPr/>
-              <a:t>8</a:t>
+              <a:t>15</a:t>
             </a:fld>
             <a:endParaRPr lang="en-US" b="1" dirty="0"/>
           </a:p>
@@ -3314,7 +3333,7 @@
             <a:fld id="{4CBF50E3-ED67-46F2-ABFC-A36EE1082CF7}" type="slidenum">
               <a:rPr lang="en-US" b="1" smtClean="0"/>
               <a:pPr/>
-              <a:t>9</a:t>
+              <a:t>16</a:t>
             </a:fld>
             <a:endParaRPr lang="en-US" b="1" dirty="0"/>
           </a:p>
@@ -11587,6 +11606,1735 @@
 </p:sld>
 </file>
 
+<file path=ppt/slides/slide10.xml><?xml version="1.0" encoding="utf-8"?>
+<p:sld xmlns:a="http://schemas.openxmlformats.org/drawingml/2006/main" xmlns:r="http://schemas.openxmlformats.org/officeDocument/2006/relationships" xmlns:p="http://schemas.openxmlformats.org/presentationml/2006/main">
+  <p:cSld>
+    <p:spTree>
+      <p:nvGrpSpPr>
+        <p:cNvPr id="1" name=""/>
+        <p:cNvGrpSpPr/>
+        <p:nvPr/>
+      </p:nvGrpSpPr>
+      <p:grpSpPr>
+        <a:xfrm>
+          <a:off x="0" y="0"/>
+          <a:ext cx="0" cy="0"/>
+          <a:chOff x="0" y="0"/>
+          <a:chExt cx="0" cy="0"/>
+        </a:xfrm>
+      </p:grpSpPr>
+      <p:sp>
+        <p:nvSpPr>
+          <p:cNvPr id="8" name="Textplatzhalter 7"/>
+          <p:cNvSpPr>
+            <a:spLocks noGrp="1"/>
+          </p:cNvSpPr>
+          <p:nvPr>
+            <p:ph type="body" sz="quarter" idx="13"/>
+          </p:nvPr>
+        </p:nvSpPr>
+        <p:spPr/>
+        <p:txBody>
+          <a:bodyPr/>
+          <a:lstStyle/>
+          <a:p>
+            <a:r>
+              <a:rPr lang="de-DE" dirty="0"/>
+              <a:t>Vorher: 61 Tabellen, 1741 MB</a:t>
+            </a:r>
+          </a:p>
+          <a:p>
+            <a:r>
+              <a:rPr lang="de-DE" dirty="0"/>
+              <a:t>Nachher: 16 Tabellen, 601 MB</a:t>
+            </a:r>
+          </a:p>
+        </p:txBody>
+      </p:sp>
+      <p:sp>
+        <p:nvSpPr>
+          <p:cNvPr id="7" name="Titel 6"/>
+          <p:cNvSpPr>
+            <a:spLocks noGrp="1"/>
+          </p:cNvSpPr>
+          <p:nvPr>
+            <p:ph type="title"/>
+          </p:nvPr>
+        </p:nvSpPr>
+        <p:spPr>
+          <a:xfrm>
+            <a:off x="358776" y="108001"/>
+            <a:ext cx="6877051" cy="927588"/>
+          </a:xfrm>
+        </p:spPr>
+        <p:txBody>
+          <a:bodyPr/>
+          <a:lstStyle/>
+          <a:p>
+            <a:r>
+              <a:rPr lang="de-DE" dirty="0"/>
+              <a:t>Beispiele und Statistiken</a:t>
+            </a:r>
+          </a:p>
+        </p:txBody>
+      </p:sp>
+      <p:sp>
+        <p:nvSpPr>
+          <p:cNvPr id="4" name="Datumsplatzhalter 3"/>
+          <p:cNvSpPr>
+            <a:spLocks noGrp="1"/>
+          </p:cNvSpPr>
+          <p:nvPr>
+            <p:ph type="dt" sz="half" idx="14"/>
+          </p:nvPr>
+        </p:nvSpPr>
+        <p:spPr/>
+        <p:txBody>
+          <a:bodyPr/>
+          <a:lstStyle/>
+          <a:p>
+            <a:r>
+              <a:rPr lang="en-US"/>
+              <a:t>Speaker, Job Description, Date if needed</a:t>
+            </a:r>
+            <a:endParaRPr lang="en-US" dirty="0"/>
+          </a:p>
+        </p:txBody>
+      </p:sp>
+      <p:sp>
+        <p:nvSpPr>
+          <p:cNvPr id="5" name="Fußzeilenplatzhalter 4"/>
+          <p:cNvSpPr>
+            <a:spLocks noGrp="1"/>
+          </p:cNvSpPr>
+          <p:nvPr>
+            <p:ph type="ftr" sz="quarter" idx="15"/>
+          </p:nvPr>
+        </p:nvSpPr>
+        <p:spPr/>
+        <p:txBody>
+          <a:bodyPr/>
+          <a:lstStyle/>
+          <a:p>
+            <a:r>
+              <a:rPr lang="en-US"/>
+              <a:t>Presentation Title</a:t>
+            </a:r>
+            <a:endParaRPr lang="en-US" dirty="0"/>
+          </a:p>
+        </p:txBody>
+      </p:sp>
+      <p:sp>
+        <p:nvSpPr>
+          <p:cNvPr id="6" name="Foliennummernplatzhalter 5"/>
+          <p:cNvSpPr>
+            <a:spLocks noGrp="1"/>
+          </p:cNvSpPr>
+          <p:nvPr>
+            <p:ph type="sldNum" sz="quarter" idx="16"/>
+          </p:nvPr>
+        </p:nvSpPr>
+        <p:spPr/>
+        <p:txBody>
+          <a:bodyPr/>
+          <a:lstStyle/>
+          <a:p>
+            <a:r>
+              <a:rPr lang="en-US"/>
+              <a:t>Chart </a:t>
+            </a:r>
+            <a:fld id="{91D913BA-B0D8-4B51-9328-DFAA0B370309}" type="slidenum">
+              <a:rPr lang="en-US" b="1" smtClean="0"/>
+              <a:pPr/>
+              <a:t>10</a:t>
+            </a:fld>
+            <a:endParaRPr lang="en-US" b="1" dirty="0"/>
+          </a:p>
+        </p:txBody>
+      </p:sp>
+    </p:spTree>
+    <p:extLst>
+      <p:ext uri="{BB962C8B-B14F-4D97-AF65-F5344CB8AC3E}">
+        <p14:creationId xmlns:p14="http://schemas.microsoft.com/office/powerpoint/2010/main" val="3110667540"/>
+      </p:ext>
+    </p:extLst>
+  </p:cSld>
+  <p:clrMapOvr>
+    <a:masterClrMapping/>
+  </p:clrMapOvr>
+  <p:transition>
+    <p:fade/>
+  </p:transition>
+</p:sld>
+</file>
+
+<file path=ppt/slides/slide11.xml><?xml version="1.0" encoding="utf-8"?>
+<p:sld xmlns:a="http://schemas.openxmlformats.org/drawingml/2006/main" xmlns:r="http://schemas.openxmlformats.org/officeDocument/2006/relationships" xmlns:p="http://schemas.openxmlformats.org/presentationml/2006/main">
+  <p:cSld>
+    <p:spTree>
+      <p:nvGrpSpPr>
+        <p:cNvPr id="1" name=""/>
+        <p:cNvGrpSpPr/>
+        <p:nvPr/>
+      </p:nvGrpSpPr>
+      <p:grpSpPr>
+        <a:xfrm>
+          <a:off x="0" y="0"/>
+          <a:ext cx="0" cy="0"/>
+          <a:chOff x="0" y="0"/>
+          <a:chExt cx="0" cy="0"/>
+        </a:xfrm>
+      </p:grpSpPr>
+      <p:sp>
+        <p:nvSpPr>
+          <p:cNvPr id="8" name="Textplatzhalter 7"/>
+          <p:cNvSpPr>
+            <a:spLocks noGrp="1"/>
+          </p:cNvSpPr>
+          <p:nvPr>
+            <p:ph type="body" sz="quarter" idx="13"/>
+          </p:nvPr>
+        </p:nvSpPr>
+        <p:spPr/>
+        <p:txBody>
+          <a:bodyPr/>
+          <a:lstStyle/>
+          <a:p>
+            <a:r>
+              <a:rPr lang="de-DE" dirty="0"/>
+              <a:t>Vermeintlich schwierige Aufgaben können sehr einfach sein …</a:t>
+            </a:r>
+          </a:p>
+          <a:p>
+            <a:pPr lvl="1"/>
+            <a:r>
+              <a:rPr lang="de-DE" dirty="0"/>
+              <a:t>IHME-Daten: 31 Tabellen mit selbem Schema</a:t>
+            </a:r>
+          </a:p>
+          <a:p>
+            <a:pPr lvl="1"/>
+            <a:r>
+              <a:rPr lang="de-DE" dirty="0"/>
+              <a:t>Nach Recherche sind von den 16.500.000 Datensätzen noch 950.000 relevant</a:t>
+            </a:r>
+          </a:p>
+          <a:p>
+            <a:pPr lvl="1"/>
+            <a:r>
+              <a:rPr lang="de-DE" dirty="0"/>
+              <a:t>Über UNION verknüpft und gespeichert, Rest gelöscht</a:t>
+            </a:r>
+          </a:p>
+          <a:p>
+            <a:r>
+              <a:rPr lang="de-DE" dirty="0"/>
+              <a:t>… und vermeintlich einfache Aufgaben können sehr schwer werden!</a:t>
+            </a:r>
+          </a:p>
+          <a:p>
+            <a:pPr lvl="1"/>
+            <a:r>
+              <a:rPr lang="de-DE" dirty="0" err="1"/>
+              <a:t>GHDx</a:t>
+            </a:r>
+            <a:r>
+              <a:rPr lang="de-DE" dirty="0"/>
+              <a:t>-Daten: 17 Tabellen mit selbem Schlüssel und jeweils einer Kennzahl („Code“ + „Year“ und z.B. „Share Women“)</a:t>
+            </a:r>
+          </a:p>
+          <a:p>
+            <a:pPr lvl="1"/>
+            <a:r>
+              <a:rPr lang="de-DE" dirty="0"/>
+              <a:t>Aber: kaum Schlüssel, die in allen 17 Tabellen vorkommen -&gt; INNER JOIN nicht möglich, also FULL OUTER JOIN</a:t>
+            </a:r>
+          </a:p>
+          <a:p>
+            <a:pPr lvl="1"/>
+            <a:r>
+              <a:rPr lang="de-DE" dirty="0"/>
+              <a:t>Aber: Schlüssel geht verloren, wenn aus einer festen Spalte der 17 Tabellen bezogen, in welcher der Schlüssel nicht vorhanden ist</a:t>
+            </a:r>
+          </a:p>
+          <a:p>
+            <a:pPr lvl="1"/>
+            <a:r>
+              <a:rPr lang="de-DE" dirty="0"/>
+              <a:t>Also: je Schlüssel eine Anfrage mit FULL OUTER JOIN und Schlüssel als „dynamisch gesetzte Konstante“ ausführen -&gt; extrem aufwändig!</a:t>
+            </a:r>
+          </a:p>
+        </p:txBody>
+      </p:sp>
+      <p:sp>
+        <p:nvSpPr>
+          <p:cNvPr id="7" name="Titel 6"/>
+          <p:cNvSpPr>
+            <a:spLocks noGrp="1"/>
+          </p:cNvSpPr>
+          <p:nvPr>
+            <p:ph type="title"/>
+          </p:nvPr>
+        </p:nvSpPr>
+        <p:spPr>
+          <a:xfrm>
+            <a:off x="358776" y="108001"/>
+            <a:ext cx="6877051" cy="927588"/>
+          </a:xfrm>
+        </p:spPr>
+        <p:txBody>
+          <a:bodyPr/>
+          <a:lstStyle/>
+          <a:p>
+            <a:r>
+              <a:rPr lang="de-DE" dirty="0"/>
+              <a:t>Was wir gelernt haben</a:t>
+            </a:r>
+          </a:p>
+        </p:txBody>
+      </p:sp>
+      <p:sp>
+        <p:nvSpPr>
+          <p:cNvPr id="4" name="Datumsplatzhalter 3"/>
+          <p:cNvSpPr>
+            <a:spLocks noGrp="1"/>
+          </p:cNvSpPr>
+          <p:nvPr>
+            <p:ph type="dt" sz="half" idx="14"/>
+          </p:nvPr>
+        </p:nvSpPr>
+        <p:spPr/>
+        <p:txBody>
+          <a:bodyPr/>
+          <a:lstStyle/>
+          <a:p>
+            <a:r>
+              <a:rPr lang="en-US"/>
+              <a:t>Speaker, Job Description, Date if needed</a:t>
+            </a:r>
+            <a:endParaRPr lang="en-US" dirty="0"/>
+          </a:p>
+        </p:txBody>
+      </p:sp>
+      <p:sp>
+        <p:nvSpPr>
+          <p:cNvPr id="5" name="Fußzeilenplatzhalter 4"/>
+          <p:cNvSpPr>
+            <a:spLocks noGrp="1"/>
+          </p:cNvSpPr>
+          <p:nvPr>
+            <p:ph type="ftr" sz="quarter" idx="15"/>
+          </p:nvPr>
+        </p:nvSpPr>
+        <p:spPr/>
+        <p:txBody>
+          <a:bodyPr/>
+          <a:lstStyle/>
+          <a:p>
+            <a:r>
+              <a:rPr lang="en-US"/>
+              <a:t>Presentation Title</a:t>
+            </a:r>
+            <a:endParaRPr lang="en-US" dirty="0"/>
+          </a:p>
+        </p:txBody>
+      </p:sp>
+      <p:sp>
+        <p:nvSpPr>
+          <p:cNvPr id="6" name="Foliennummernplatzhalter 5"/>
+          <p:cNvSpPr>
+            <a:spLocks noGrp="1"/>
+          </p:cNvSpPr>
+          <p:nvPr>
+            <p:ph type="sldNum" sz="quarter" idx="16"/>
+          </p:nvPr>
+        </p:nvSpPr>
+        <p:spPr/>
+        <p:txBody>
+          <a:bodyPr/>
+          <a:lstStyle/>
+          <a:p>
+            <a:r>
+              <a:rPr lang="en-US"/>
+              <a:t>Chart </a:t>
+            </a:r>
+            <a:fld id="{91D913BA-B0D8-4B51-9328-DFAA0B370309}" type="slidenum">
+              <a:rPr lang="en-US" b="1" smtClean="0"/>
+              <a:pPr/>
+              <a:t>11</a:t>
+            </a:fld>
+            <a:endParaRPr lang="en-US" b="1" dirty="0"/>
+          </a:p>
+        </p:txBody>
+      </p:sp>
+    </p:spTree>
+    <p:extLst>
+      <p:ext uri="{BB962C8B-B14F-4D97-AF65-F5344CB8AC3E}">
+        <p14:creationId xmlns:p14="http://schemas.microsoft.com/office/powerpoint/2010/main" val="3343668505"/>
+      </p:ext>
+    </p:extLst>
+  </p:cSld>
+  <p:clrMapOvr>
+    <a:masterClrMapping/>
+  </p:clrMapOvr>
+  <p:transition>
+    <p:fade/>
+  </p:transition>
+  <p:timing>
+    <p:tnLst>
+      <p:par>
+        <p:cTn id="1" dur="indefinite" restart="never" nodeType="tmRoot">
+          <p:childTnLst>
+            <p:seq concurrent="1" nextAc="seek">
+              <p:cTn id="2" dur="indefinite" nodeType="mainSeq">
+                <p:childTnLst>
+                  <p:par>
+                    <p:cTn id="3" fill="hold">
+                      <p:stCondLst>
+                        <p:cond delay="indefinite"/>
+                      </p:stCondLst>
+                      <p:childTnLst>
+                        <p:par>
+                          <p:cTn id="4" fill="hold">
+                            <p:stCondLst>
+                              <p:cond delay="0"/>
+                            </p:stCondLst>
+                            <p:childTnLst>
+                              <p:par>
+                                <p:cTn id="5" presetID="10" presetClass="entr" presetSubtype="0" fill="hold" nodeType="clickEffect">
+                                  <p:stCondLst>
+                                    <p:cond delay="0"/>
+                                  </p:stCondLst>
+                                  <p:childTnLst>
+                                    <p:set>
+                                      <p:cBhvr>
+                                        <p:cTn id="6" dur="1" fill="hold">
+                                          <p:stCondLst>
+                                            <p:cond delay="0"/>
+                                          </p:stCondLst>
+                                        </p:cTn>
+                                        <p:tgtEl>
+                                          <p:spTgt spid="8">
+                                            <p:txEl>
+                                              <p:pRg st="4" end="4"/>
+                                            </p:txEl>
+                                          </p:spTgt>
+                                        </p:tgtEl>
+                                        <p:attrNameLst>
+                                          <p:attrName>style.visibility</p:attrName>
+                                        </p:attrNameLst>
+                                      </p:cBhvr>
+                                      <p:to>
+                                        <p:strVal val="visible"/>
+                                      </p:to>
+                                    </p:set>
+                                    <p:animEffect transition="in" filter="fade">
+                                      <p:cBhvr>
+                                        <p:cTn id="7" dur="500"/>
+                                        <p:tgtEl>
+                                          <p:spTgt spid="8">
+                                            <p:txEl>
+                                              <p:pRg st="4" end="4"/>
+                                            </p:txEl>
+                                          </p:spTgt>
+                                        </p:tgtEl>
+                                      </p:cBhvr>
+                                    </p:animEffect>
+                                  </p:childTnLst>
+                                </p:cTn>
+                              </p:par>
+                              <p:par>
+                                <p:cTn id="8" presetID="10" presetClass="entr" presetSubtype="0" fill="hold" nodeType="withEffect">
+                                  <p:stCondLst>
+                                    <p:cond delay="0"/>
+                                  </p:stCondLst>
+                                  <p:childTnLst>
+                                    <p:set>
+                                      <p:cBhvr>
+                                        <p:cTn id="9" dur="1" fill="hold">
+                                          <p:stCondLst>
+                                            <p:cond delay="0"/>
+                                          </p:stCondLst>
+                                        </p:cTn>
+                                        <p:tgtEl>
+                                          <p:spTgt spid="8">
+                                            <p:txEl>
+                                              <p:pRg st="5" end="5"/>
+                                            </p:txEl>
+                                          </p:spTgt>
+                                        </p:tgtEl>
+                                        <p:attrNameLst>
+                                          <p:attrName>style.visibility</p:attrName>
+                                        </p:attrNameLst>
+                                      </p:cBhvr>
+                                      <p:to>
+                                        <p:strVal val="visible"/>
+                                      </p:to>
+                                    </p:set>
+                                    <p:animEffect transition="in" filter="fade">
+                                      <p:cBhvr>
+                                        <p:cTn id="10" dur="500"/>
+                                        <p:tgtEl>
+                                          <p:spTgt spid="8">
+                                            <p:txEl>
+                                              <p:pRg st="5" end="5"/>
+                                            </p:txEl>
+                                          </p:spTgt>
+                                        </p:tgtEl>
+                                      </p:cBhvr>
+                                    </p:animEffect>
+                                  </p:childTnLst>
+                                </p:cTn>
+                              </p:par>
+                              <p:par>
+                                <p:cTn id="11" presetID="10" presetClass="entr" presetSubtype="0" fill="hold" nodeType="withEffect">
+                                  <p:stCondLst>
+                                    <p:cond delay="0"/>
+                                  </p:stCondLst>
+                                  <p:childTnLst>
+                                    <p:set>
+                                      <p:cBhvr>
+                                        <p:cTn id="12" dur="1" fill="hold">
+                                          <p:stCondLst>
+                                            <p:cond delay="0"/>
+                                          </p:stCondLst>
+                                        </p:cTn>
+                                        <p:tgtEl>
+                                          <p:spTgt spid="8">
+                                            <p:txEl>
+                                              <p:pRg st="6" end="6"/>
+                                            </p:txEl>
+                                          </p:spTgt>
+                                        </p:tgtEl>
+                                        <p:attrNameLst>
+                                          <p:attrName>style.visibility</p:attrName>
+                                        </p:attrNameLst>
+                                      </p:cBhvr>
+                                      <p:to>
+                                        <p:strVal val="visible"/>
+                                      </p:to>
+                                    </p:set>
+                                    <p:animEffect transition="in" filter="fade">
+                                      <p:cBhvr>
+                                        <p:cTn id="13" dur="500"/>
+                                        <p:tgtEl>
+                                          <p:spTgt spid="8">
+                                            <p:txEl>
+                                              <p:pRg st="6" end="6"/>
+                                            </p:txEl>
+                                          </p:spTgt>
+                                        </p:tgtEl>
+                                      </p:cBhvr>
+                                    </p:animEffect>
+                                  </p:childTnLst>
+                                </p:cTn>
+                              </p:par>
+                              <p:par>
+                                <p:cTn id="14" presetID="10" presetClass="entr" presetSubtype="0" fill="hold" nodeType="withEffect">
+                                  <p:stCondLst>
+                                    <p:cond delay="0"/>
+                                  </p:stCondLst>
+                                  <p:childTnLst>
+                                    <p:set>
+                                      <p:cBhvr>
+                                        <p:cTn id="15" dur="1" fill="hold">
+                                          <p:stCondLst>
+                                            <p:cond delay="0"/>
+                                          </p:stCondLst>
+                                        </p:cTn>
+                                        <p:tgtEl>
+                                          <p:spTgt spid="8">
+                                            <p:txEl>
+                                              <p:pRg st="7" end="7"/>
+                                            </p:txEl>
+                                          </p:spTgt>
+                                        </p:tgtEl>
+                                        <p:attrNameLst>
+                                          <p:attrName>style.visibility</p:attrName>
+                                        </p:attrNameLst>
+                                      </p:cBhvr>
+                                      <p:to>
+                                        <p:strVal val="visible"/>
+                                      </p:to>
+                                    </p:set>
+                                    <p:animEffect transition="in" filter="fade">
+                                      <p:cBhvr>
+                                        <p:cTn id="16" dur="500"/>
+                                        <p:tgtEl>
+                                          <p:spTgt spid="8">
+                                            <p:txEl>
+                                              <p:pRg st="7" end="7"/>
+                                            </p:txEl>
+                                          </p:spTgt>
+                                        </p:tgtEl>
+                                      </p:cBhvr>
+                                    </p:animEffect>
+                                  </p:childTnLst>
+                                </p:cTn>
+                              </p:par>
+                              <p:par>
+                                <p:cTn id="17" presetID="10" presetClass="entr" presetSubtype="0" fill="hold" nodeType="withEffect">
+                                  <p:stCondLst>
+                                    <p:cond delay="0"/>
+                                  </p:stCondLst>
+                                  <p:childTnLst>
+                                    <p:set>
+                                      <p:cBhvr>
+                                        <p:cTn id="18" dur="1" fill="hold">
+                                          <p:stCondLst>
+                                            <p:cond delay="0"/>
+                                          </p:stCondLst>
+                                        </p:cTn>
+                                        <p:tgtEl>
+                                          <p:spTgt spid="8">
+                                            <p:txEl>
+                                              <p:pRg st="8" end="8"/>
+                                            </p:txEl>
+                                          </p:spTgt>
+                                        </p:tgtEl>
+                                        <p:attrNameLst>
+                                          <p:attrName>style.visibility</p:attrName>
+                                        </p:attrNameLst>
+                                      </p:cBhvr>
+                                      <p:to>
+                                        <p:strVal val="visible"/>
+                                      </p:to>
+                                    </p:set>
+                                    <p:animEffect transition="in" filter="fade">
+                                      <p:cBhvr>
+                                        <p:cTn id="19" dur="500"/>
+                                        <p:tgtEl>
+                                          <p:spTgt spid="8">
+                                            <p:txEl>
+                                              <p:pRg st="8" end="8"/>
+                                            </p:txEl>
+                                          </p:spTgt>
+                                        </p:tgtEl>
+                                      </p:cBhvr>
+                                    </p:animEffect>
+                                  </p:childTnLst>
+                                </p:cTn>
+                              </p:par>
+                            </p:childTnLst>
+                          </p:cTn>
+                        </p:par>
+                      </p:childTnLst>
+                    </p:cTn>
+                  </p:par>
+                </p:childTnLst>
+              </p:cTn>
+              <p:prevCondLst>
+                <p:cond evt="onPrev" delay="0">
+                  <p:tgtEl>
+                    <p:sldTgt/>
+                  </p:tgtEl>
+                </p:cond>
+              </p:prevCondLst>
+              <p:nextCondLst>
+                <p:cond evt="onNext" delay="0">
+                  <p:tgtEl>
+                    <p:sldTgt/>
+                  </p:tgtEl>
+                </p:cond>
+              </p:nextCondLst>
+            </p:seq>
+          </p:childTnLst>
+        </p:cTn>
+      </p:par>
+    </p:tnLst>
+  </p:timing>
+</p:sld>
+</file>
+
+<file path=ppt/slides/slide12.xml><?xml version="1.0" encoding="utf-8"?>
+<p:sld xmlns:a="http://schemas.openxmlformats.org/drawingml/2006/main" xmlns:r="http://schemas.openxmlformats.org/officeDocument/2006/relationships" xmlns:p="http://schemas.openxmlformats.org/presentationml/2006/main">
+  <p:cSld>
+    <p:spTree>
+      <p:nvGrpSpPr>
+        <p:cNvPr id="1" name=""/>
+        <p:cNvGrpSpPr/>
+        <p:nvPr/>
+      </p:nvGrpSpPr>
+      <p:grpSpPr>
+        <a:xfrm>
+          <a:off x="0" y="0"/>
+          <a:ext cx="0" cy="0"/>
+          <a:chOff x="0" y="0"/>
+          <a:chExt cx="0" cy="0"/>
+        </a:xfrm>
+      </p:grpSpPr>
+      <p:sp>
+        <p:nvSpPr>
+          <p:cNvPr id="8" name="Textplatzhalter 7"/>
+          <p:cNvSpPr>
+            <a:spLocks noGrp="1"/>
+          </p:cNvSpPr>
+          <p:nvPr>
+            <p:ph type="body" sz="quarter" idx="13"/>
+          </p:nvPr>
+        </p:nvSpPr>
+        <p:spPr>
+          <a:xfrm>
+            <a:off x="358776" y="1239837"/>
+            <a:ext cx="6877051" cy="395809"/>
+          </a:xfrm>
+        </p:spPr>
+        <p:txBody>
+          <a:bodyPr/>
+          <a:lstStyle/>
+          <a:p>
+            <a:r>
+              <a:rPr lang="de-DE" dirty="0"/>
+              <a:t>Zur Veranschaulichung: </a:t>
+            </a:r>
+            <a:r>
+              <a:rPr lang="de-DE" dirty="0" err="1"/>
+              <a:t>GHDx</a:t>
+            </a:r>
+            <a:r>
+              <a:rPr lang="de-DE" dirty="0"/>
+              <a:t>-Tabelle nach ersten Anläufen…</a:t>
+            </a:r>
+          </a:p>
+        </p:txBody>
+      </p:sp>
+      <p:sp>
+        <p:nvSpPr>
+          <p:cNvPr id="7" name="Titel 6"/>
+          <p:cNvSpPr>
+            <a:spLocks noGrp="1"/>
+          </p:cNvSpPr>
+          <p:nvPr>
+            <p:ph type="title"/>
+          </p:nvPr>
+        </p:nvSpPr>
+        <p:spPr>
+          <a:xfrm>
+            <a:off x="358776" y="108001"/>
+            <a:ext cx="6877051" cy="927588"/>
+          </a:xfrm>
+        </p:spPr>
+        <p:txBody>
+          <a:bodyPr/>
+          <a:lstStyle/>
+          <a:p>
+            <a:r>
+              <a:rPr lang="de-DE" dirty="0"/>
+              <a:t>Was wir gelernt haben</a:t>
+            </a:r>
+          </a:p>
+        </p:txBody>
+      </p:sp>
+      <p:sp>
+        <p:nvSpPr>
+          <p:cNvPr id="4" name="Datumsplatzhalter 3"/>
+          <p:cNvSpPr>
+            <a:spLocks noGrp="1"/>
+          </p:cNvSpPr>
+          <p:nvPr>
+            <p:ph type="dt" sz="half" idx="14"/>
+          </p:nvPr>
+        </p:nvSpPr>
+        <p:spPr/>
+        <p:txBody>
+          <a:bodyPr/>
+          <a:lstStyle/>
+          <a:p>
+            <a:r>
+              <a:rPr lang="en-US"/>
+              <a:t>Speaker, Job Description, Date if needed</a:t>
+            </a:r>
+            <a:endParaRPr lang="en-US" dirty="0"/>
+          </a:p>
+        </p:txBody>
+      </p:sp>
+      <p:sp>
+        <p:nvSpPr>
+          <p:cNvPr id="5" name="Fußzeilenplatzhalter 4"/>
+          <p:cNvSpPr>
+            <a:spLocks noGrp="1"/>
+          </p:cNvSpPr>
+          <p:nvPr>
+            <p:ph type="ftr" sz="quarter" idx="15"/>
+          </p:nvPr>
+        </p:nvSpPr>
+        <p:spPr/>
+        <p:txBody>
+          <a:bodyPr/>
+          <a:lstStyle/>
+          <a:p>
+            <a:r>
+              <a:rPr lang="en-US"/>
+              <a:t>Presentation Title</a:t>
+            </a:r>
+            <a:endParaRPr lang="en-US" dirty="0"/>
+          </a:p>
+        </p:txBody>
+      </p:sp>
+      <p:sp>
+        <p:nvSpPr>
+          <p:cNvPr id="6" name="Foliennummernplatzhalter 5"/>
+          <p:cNvSpPr>
+            <a:spLocks noGrp="1"/>
+          </p:cNvSpPr>
+          <p:nvPr>
+            <p:ph type="sldNum" sz="quarter" idx="16"/>
+          </p:nvPr>
+        </p:nvSpPr>
+        <p:spPr/>
+        <p:txBody>
+          <a:bodyPr/>
+          <a:lstStyle/>
+          <a:p>
+            <a:r>
+              <a:rPr lang="en-US"/>
+              <a:t>Chart </a:t>
+            </a:r>
+            <a:fld id="{91D913BA-B0D8-4B51-9328-DFAA0B370309}" type="slidenum">
+              <a:rPr lang="en-US" b="1" smtClean="0"/>
+              <a:pPr/>
+              <a:t>12</a:t>
+            </a:fld>
+            <a:endParaRPr lang="en-US" b="1" dirty="0"/>
+          </a:p>
+        </p:txBody>
+      </p:sp>
+      <p:pic>
+        <p:nvPicPr>
+          <p:cNvPr id="9" name="Grafik 8">
+            <a:extLst>
+              <a:ext uri="{FF2B5EF4-FFF2-40B4-BE49-F238E27FC236}">
+                <a16:creationId xmlns:a16="http://schemas.microsoft.com/office/drawing/2014/main" id="{1133D053-4EE1-4F7F-8BC2-5ABBCDE8D687}"/>
+              </a:ext>
+            </a:extLst>
+          </p:cNvPr>
+          <p:cNvPicPr>
+            <a:picLocks noChangeAspect="1"/>
+          </p:cNvPicPr>
+          <p:nvPr/>
+        </p:nvPicPr>
+        <p:blipFill>
+          <a:blip r:embed="rId2"/>
+          <a:stretch>
+            <a:fillRect/>
+          </a:stretch>
+        </p:blipFill>
+        <p:spPr>
+          <a:xfrm>
+            <a:off x="595712" y="1635646"/>
+            <a:ext cx="6368662" cy="2520282"/>
+          </a:xfrm>
+          <a:prstGeom prst="rect">
+            <a:avLst/>
+          </a:prstGeom>
+          <a:ln>
+            <a:solidFill>
+              <a:schemeClr val="tx1"/>
+            </a:solidFill>
+          </a:ln>
+          <a:effectLst>
+            <a:outerShdw blurRad="50800" dist="38100" dir="2700000" algn="tl" rotWithShape="0">
+              <a:prstClr val="black">
+                <a:alpha val="40000"/>
+              </a:prstClr>
+            </a:outerShdw>
+          </a:effectLst>
+        </p:spPr>
+      </p:pic>
+    </p:spTree>
+    <p:extLst>
+      <p:ext uri="{BB962C8B-B14F-4D97-AF65-F5344CB8AC3E}">
+        <p14:creationId xmlns:p14="http://schemas.microsoft.com/office/powerpoint/2010/main" val="1980631348"/>
+      </p:ext>
+    </p:extLst>
+  </p:cSld>
+  <p:clrMapOvr>
+    <a:masterClrMapping/>
+  </p:clrMapOvr>
+  <p:transition>
+    <p:fade/>
+  </p:transition>
+</p:sld>
+</file>
+
+<file path=ppt/slides/slide13.xml><?xml version="1.0" encoding="utf-8"?>
+<p:sld xmlns:a="http://schemas.openxmlformats.org/drawingml/2006/main" xmlns:r="http://schemas.openxmlformats.org/officeDocument/2006/relationships" xmlns:p="http://schemas.openxmlformats.org/presentationml/2006/main">
+  <p:cSld>
+    <p:spTree>
+      <p:nvGrpSpPr>
+        <p:cNvPr id="1" name=""/>
+        <p:cNvGrpSpPr/>
+        <p:nvPr/>
+      </p:nvGrpSpPr>
+      <p:grpSpPr>
+        <a:xfrm>
+          <a:off x="0" y="0"/>
+          <a:ext cx="0" cy="0"/>
+          <a:chOff x="0" y="0"/>
+          <a:chExt cx="0" cy="0"/>
+        </a:xfrm>
+      </p:grpSpPr>
+      <p:sp>
+        <p:nvSpPr>
+          <p:cNvPr id="8" name="Textplatzhalter 7"/>
+          <p:cNvSpPr>
+            <a:spLocks noGrp="1"/>
+          </p:cNvSpPr>
+          <p:nvPr>
+            <p:ph type="body" sz="quarter" idx="13"/>
+          </p:nvPr>
+        </p:nvSpPr>
+        <p:spPr/>
+        <p:txBody>
+          <a:bodyPr/>
+          <a:lstStyle/>
+          <a:p>
+            <a:r>
+              <a:rPr lang="de-DE" dirty="0"/>
+              <a:t>Dann aber doch noch mit dem Happy End! </a:t>
+            </a:r>
+            <a:r>
+              <a:rPr lang="de-DE" dirty="0">
+                <a:sym typeface="Wingdings" panose="05000000000000000000" pitchFamily="2" charset="2"/>
+              </a:rPr>
+              <a:t></a:t>
+            </a:r>
+            <a:endParaRPr lang="de-DE" dirty="0"/>
+          </a:p>
+        </p:txBody>
+      </p:sp>
+      <p:sp>
+        <p:nvSpPr>
+          <p:cNvPr id="7" name="Titel 6"/>
+          <p:cNvSpPr>
+            <a:spLocks noGrp="1"/>
+          </p:cNvSpPr>
+          <p:nvPr>
+            <p:ph type="title"/>
+          </p:nvPr>
+        </p:nvSpPr>
+        <p:spPr>
+          <a:xfrm>
+            <a:off x="358776" y="108001"/>
+            <a:ext cx="6877051" cy="927588"/>
+          </a:xfrm>
+        </p:spPr>
+        <p:txBody>
+          <a:bodyPr/>
+          <a:lstStyle/>
+          <a:p>
+            <a:r>
+              <a:rPr lang="de-DE" dirty="0"/>
+              <a:t>Was wir gelernt haben</a:t>
+            </a:r>
+          </a:p>
+        </p:txBody>
+      </p:sp>
+      <p:sp>
+        <p:nvSpPr>
+          <p:cNvPr id="4" name="Datumsplatzhalter 3"/>
+          <p:cNvSpPr>
+            <a:spLocks noGrp="1"/>
+          </p:cNvSpPr>
+          <p:nvPr>
+            <p:ph type="dt" sz="half" idx="14"/>
+          </p:nvPr>
+        </p:nvSpPr>
+        <p:spPr/>
+        <p:txBody>
+          <a:bodyPr/>
+          <a:lstStyle/>
+          <a:p>
+            <a:r>
+              <a:rPr lang="en-US"/>
+              <a:t>Speaker, Job Description, Date if needed</a:t>
+            </a:r>
+            <a:endParaRPr lang="en-US" dirty="0"/>
+          </a:p>
+        </p:txBody>
+      </p:sp>
+      <p:sp>
+        <p:nvSpPr>
+          <p:cNvPr id="5" name="Fußzeilenplatzhalter 4"/>
+          <p:cNvSpPr>
+            <a:spLocks noGrp="1"/>
+          </p:cNvSpPr>
+          <p:nvPr>
+            <p:ph type="ftr" sz="quarter" idx="15"/>
+          </p:nvPr>
+        </p:nvSpPr>
+        <p:spPr/>
+        <p:txBody>
+          <a:bodyPr/>
+          <a:lstStyle/>
+          <a:p>
+            <a:r>
+              <a:rPr lang="en-US"/>
+              <a:t>Presentation Title</a:t>
+            </a:r>
+            <a:endParaRPr lang="en-US" dirty="0"/>
+          </a:p>
+        </p:txBody>
+      </p:sp>
+      <p:sp>
+        <p:nvSpPr>
+          <p:cNvPr id="6" name="Foliennummernplatzhalter 5"/>
+          <p:cNvSpPr>
+            <a:spLocks noGrp="1"/>
+          </p:cNvSpPr>
+          <p:nvPr>
+            <p:ph type="sldNum" sz="quarter" idx="16"/>
+          </p:nvPr>
+        </p:nvSpPr>
+        <p:spPr/>
+        <p:txBody>
+          <a:bodyPr/>
+          <a:lstStyle/>
+          <a:p>
+            <a:r>
+              <a:rPr lang="en-US"/>
+              <a:t>Chart </a:t>
+            </a:r>
+            <a:fld id="{91D913BA-B0D8-4B51-9328-DFAA0B370309}" type="slidenum">
+              <a:rPr lang="en-US" b="1" smtClean="0"/>
+              <a:pPr/>
+              <a:t>13</a:t>
+            </a:fld>
+            <a:endParaRPr lang="en-US" b="1" dirty="0"/>
+          </a:p>
+        </p:txBody>
+      </p:sp>
+      <p:pic>
+        <p:nvPicPr>
+          <p:cNvPr id="10" name="Grafik 9">
+            <a:extLst>
+              <a:ext uri="{FF2B5EF4-FFF2-40B4-BE49-F238E27FC236}">
+                <a16:creationId xmlns:a16="http://schemas.microsoft.com/office/drawing/2014/main" id="{93138120-D4D0-4B4F-B108-CF0A367BD209}"/>
+              </a:ext>
+            </a:extLst>
+          </p:cNvPr>
+          <p:cNvPicPr>
+            <a:picLocks noChangeAspect="1"/>
+          </p:cNvPicPr>
+          <p:nvPr/>
+        </p:nvPicPr>
+        <p:blipFill>
+          <a:blip r:embed="rId2"/>
+          <a:stretch>
+            <a:fillRect/>
+          </a:stretch>
+        </p:blipFill>
+        <p:spPr>
+          <a:xfrm>
+            <a:off x="611559" y="1622670"/>
+            <a:ext cx="6021079" cy="2461248"/>
+          </a:xfrm>
+          <a:prstGeom prst="rect">
+            <a:avLst/>
+          </a:prstGeom>
+          <a:ln>
+            <a:solidFill>
+              <a:schemeClr val="tx1"/>
+            </a:solidFill>
+          </a:ln>
+          <a:effectLst>
+            <a:outerShdw blurRad="50800" dist="38100" dir="2700000" algn="tl" rotWithShape="0">
+              <a:prstClr val="black">
+                <a:alpha val="40000"/>
+              </a:prstClr>
+            </a:outerShdw>
+          </a:effectLst>
+        </p:spPr>
+      </p:pic>
+    </p:spTree>
+    <p:extLst>
+      <p:ext uri="{BB962C8B-B14F-4D97-AF65-F5344CB8AC3E}">
+        <p14:creationId xmlns:p14="http://schemas.microsoft.com/office/powerpoint/2010/main" val="318148979"/>
+      </p:ext>
+    </p:extLst>
+  </p:cSld>
+  <p:clrMapOvr>
+    <a:masterClrMapping/>
+  </p:clrMapOvr>
+  <p:transition>
+    <p:fade/>
+  </p:transition>
+</p:sld>
+</file>
+
+<file path=ppt/slides/slide14.xml><?xml version="1.0" encoding="utf-8"?>
+<p:sld xmlns:a="http://schemas.openxmlformats.org/drawingml/2006/main" xmlns:r="http://schemas.openxmlformats.org/officeDocument/2006/relationships" xmlns:p="http://schemas.openxmlformats.org/presentationml/2006/main">
+  <p:cSld>
+    <p:spTree>
+      <p:nvGrpSpPr>
+        <p:cNvPr id="1" name=""/>
+        <p:cNvGrpSpPr/>
+        <p:nvPr/>
+      </p:nvGrpSpPr>
+      <p:grpSpPr>
+        <a:xfrm>
+          <a:off x="0" y="0"/>
+          <a:ext cx="0" cy="0"/>
+          <a:chOff x="0" y="0"/>
+          <a:chExt cx="0" cy="0"/>
+        </a:xfrm>
+      </p:grpSpPr>
+      <p:sp>
+        <p:nvSpPr>
+          <p:cNvPr id="6157" name="Title 6156"/>
+          <p:cNvSpPr>
+            <a:spLocks noGrp="1"/>
+          </p:cNvSpPr>
+          <p:nvPr>
+            <p:ph type="title"/>
+          </p:nvPr>
+        </p:nvSpPr>
+        <p:spPr>
+          <a:xfrm>
+            <a:off x="358776" y="108001"/>
+            <a:ext cx="6877051" cy="927588"/>
+          </a:xfrm>
+        </p:spPr>
+        <p:txBody>
+          <a:bodyPr/>
+          <a:lstStyle/>
+          <a:p>
+            <a:r>
+              <a:rPr lang="en-US" dirty="0"/>
+              <a:t>Was </a:t>
+            </a:r>
+            <a:r>
+              <a:rPr lang="en-US" dirty="0" err="1"/>
+              <a:t>wir</a:t>
+            </a:r>
+            <a:r>
+              <a:rPr lang="en-US" dirty="0"/>
+              <a:t> </a:t>
+            </a:r>
+            <a:r>
+              <a:rPr lang="en-US" dirty="0" err="1"/>
+              <a:t>gelernt</a:t>
+            </a:r>
+            <a:r>
+              <a:rPr lang="en-US" dirty="0"/>
+              <a:t> </a:t>
+            </a:r>
+            <a:r>
+              <a:rPr lang="en-US" dirty="0" err="1"/>
+              <a:t>haben</a:t>
+            </a:r>
+            <a:endParaRPr lang="en-US" dirty="0"/>
+          </a:p>
+        </p:txBody>
+      </p:sp>
+      <p:sp>
+        <p:nvSpPr>
+          <p:cNvPr id="6158" name="Text Placeholder 6157"/>
+          <p:cNvSpPr>
+            <a:spLocks noGrp="1"/>
+          </p:cNvSpPr>
+          <p:nvPr>
+            <p:ph type="body" sz="quarter" idx="13"/>
+          </p:nvPr>
+        </p:nvSpPr>
+        <p:spPr/>
+        <p:txBody>
+          <a:bodyPr>
+            <a:normAutofit/>
+          </a:bodyPr>
+          <a:lstStyle/>
+          <a:p>
+            <a:r>
+              <a:rPr lang="en-US" dirty="0"/>
+              <a:t>% in Postgres -&gt; </a:t>
+            </a:r>
+            <a:r>
+              <a:rPr lang="en-US" dirty="0" err="1"/>
+              <a:t>sqlalchemy</a:t>
+            </a:r>
+            <a:r>
+              <a:rPr lang="en-US" dirty="0"/>
+              <a:t> </a:t>
+            </a:r>
+            <a:r>
+              <a:rPr lang="en-US" dirty="0" err="1"/>
+              <a:t>interpretiert</a:t>
+            </a:r>
+            <a:r>
+              <a:rPr lang="en-US" dirty="0"/>
+              <a:t> % </a:t>
+            </a:r>
+            <a:r>
+              <a:rPr lang="en-US" dirty="0" err="1"/>
+              <a:t>als</a:t>
+            </a:r>
+            <a:r>
+              <a:rPr lang="en-US" dirty="0"/>
+              <a:t> </a:t>
+            </a:r>
+            <a:r>
+              <a:rPr lang="en-US" dirty="0" err="1"/>
+              <a:t>Platzhalter</a:t>
+            </a:r>
+            <a:r>
+              <a:rPr lang="en-US" dirty="0"/>
+              <a:t> -&gt; Wrapper </a:t>
+            </a:r>
+            <a:r>
+              <a:rPr lang="en-US" dirty="0" err="1"/>
+              <a:t>benötigt</a:t>
+            </a:r>
+            <a:endParaRPr lang="en-US" dirty="0"/>
+          </a:p>
+          <a:p>
+            <a:r>
+              <a:rPr lang="en-US" dirty="0" err="1"/>
+              <a:t>Falsche</a:t>
+            </a:r>
+            <a:r>
+              <a:rPr lang="en-US" dirty="0"/>
+              <a:t> </a:t>
+            </a:r>
+            <a:r>
+              <a:rPr lang="en-US" dirty="0" err="1"/>
+              <a:t>Annahmen</a:t>
+            </a:r>
+            <a:r>
+              <a:rPr lang="en-US" dirty="0"/>
+              <a:t>: </a:t>
+            </a:r>
+          </a:p>
+        </p:txBody>
+      </p:sp>
+      <p:sp>
+        <p:nvSpPr>
+          <p:cNvPr id="6163" name="Slide Number Placeholder 6162"/>
+          <p:cNvSpPr>
+            <a:spLocks noGrp="1"/>
+          </p:cNvSpPr>
+          <p:nvPr>
+            <p:ph type="sldNum" sz="quarter" idx="16"/>
+          </p:nvPr>
+        </p:nvSpPr>
+        <p:spPr>
+          <a:xfrm>
+            <a:off x="7416801" y="4623195"/>
+            <a:ext cx="1547813" cy="180580"/>
+          </a:xfrm>
+        </p:spPr>
+        <p:txBody>
+          <a:bodyPr/>
+          <a:lstStyle/>
+          <a:p>
+            <a:r>
+              <a:rPr lang="en-US"/>
+              <a:t>Chart </a:t>
+            </a:r>
+            <a:fld id="{91D913BA-B0D8-4B51-9328-DFAA0B370309}" type="slidenum">
+              <a:rPr lang="en-US" b="1" smtClean="0"/>
+              <a:pPr/>
+              <a:t>14</a:t>
+            </a:fld>
+            <a:endParaRPr lang="en-US" b="1" dirty="0"/>
+          </a:p>
+        </p:txBody>
+      </p:sp>
+      <p:sp>
+        <p:nvSpPr>
+          <p:cNvPr id="2" name="Date Placeholder 1"/>
+          <p:cNvSpPr>
+            <a:spLocks noGrp="1"/>
+          </p:cNvSpPr>
+          <p:nvPr>
+            <p:ph type="dt" sz="half" idx="14"/>
+          </p:nvPr>
+        </p:nvSpPr>
+        <p:spPr>
+          <a:xfrm>
+            <a:off x="7416801" y="4155928"/>
+            <a:ext cx="1547813" cy="467268"/>
+          </a:xfrm>
+        </p:spPr>
+        <p:txBody>
+          <a:bodyPr/>
+          <a:lstStyle/>
+          <a:p>
+            <a:r>
+              <a:rPr lang="en-US" dirty="0"/>
+              <a:t>Speaker, Job Description, Date if needed</a:t>
+            </a:r>
+          </a:p>
+        </p:txBody>
+      </p:sp>
+      <p:sp>
+        <p:nvSpPr>
+          <p:cNvPr id="3" name="Footer Placeholder 2"/>
+          <p:cNvSpPr>
+            <a:spLocks noGrp="1"/>
+          </p:cNvSpPr>
+          <p:nvPr>
+            <p:ph type="ftr" sz="quarter" idx="15"/>
+          </p:nvPr>
+        </p:nvSpPr>
+        <p:spPr>
+          <a:xfrm>
+            <a:off x="7416801" y="3562453"/>
+            <a:ext cx="1547813" cy="521465"/>
+          </a:xfrm>
+        </p:spPr>
+        <p:txBody>
+          <a:bodyPr/>
+          <a:lstStyle/>
+          <a:p>
+            <a:r>
+              <a:rPr lang="en-US" dirty="0"/>
+              <a:t>Presentation Title</a:t>
+            </a:r>
+          </a:p>
+        </p:txBody>
+      </p:sp>
+    </p:spTree>
+    <p:extLst>
+      <p:ext uri="{BB962C8B-B14F-4D97-AF65-F5344CB8AC3E}">
+        <p14:creationId xmlns:p14="http://schemas.microsoft.com/office/powerpoint/2010/main" val="1623418179"/>
+      </p:ext>
+    </p:extLst>
+  </p:cSld>
+  <p:clrMapOvr>
+    <a:masterClrMapping/>
+  </p:clrMapOvr>
+  <p:transition>
+    <p:fade/>
+  </p:transition>
+</p:sld>
+</file>
+
+<file path=ppt/slides/slide15.xml><?xml version="1.0" encoding="utf-8"?>
+<p:sld xmlns:a="http://schemas.openxmlformats.org/drawingml/2006/main" xmlns:r="http://schemas.openxmlformats.org/officeDocument/2006/relationships" xmlns:p="http://schemas.openxmlformats.org/presentationml/2006/main">
+  <p:cSld>
+    <p:spTree>
+      <p:nvGrpSpPr>
+        <p:cNvPr id="1" name=""/>
+        <p:cNvGrpSpPr/>
+        <p:nvPr/>
+      </p:nvGrpSpPr>
+      <p:grpSpPr>
+        <a:xfrm>
+          <a:off x="0" y="0"/>
+          <a:ext cx="0" cy="0"/>
+          <a:chOff x="0" y="0"/>
+          <a:chExt cx="0" cy="0"/>
+        </a:xfrm>
+      </p:grpSpPr>
+      <p:sp>
+        <p:nvSpPr>
+          <p:cNvPr id="6157" name="Title 6156"/>
+          <p:cNvSpPr>
+            <a:spLocks noGrp="1"/>
+          </p:cNvSpPr>
+          <p:nvPr>
+            <p:ph type="title"/>
+          </p:nvPr>
+        </p:nvSpPr>
+        <p:spPr>
+          <a:xfrm>
+            <a:off x="358776" y="108001"/>
+            <a:ext cx="6877051" cy="927588"/>
+          </a:xfrm>
+        </p:spPr>
+        <p:txBody>
+          <a:bodyPr/>
+          <a:lstStyle/>
+          <a:p>
+            <a:r>
+              <a:rPr lang="en-US" dirty="0" err="1"/>
+              <a:t>Nächste</a:t>
+            </a:r>
+            <a:r>
+              <a:rPr lang="en-US" dirty="0"/>
+              <a:t> </a:t>
+            </a:r>
+            <a:r>
+              <a:rPr lang="en-US" dirty="0" err="1"/>
+              <a:t>Schritte</a:t>
+            </a:r>
+            <a:endParaRPr lang="en-US" dirty="0"/>
+          </a:p>
+        </p:txBody>
+      </p:sp>
+      <p:sp>
+        <p:nvSpPr>
+          <p:cNvPr id="6158" name="Text Placeholder 6157"/>
+          <p:cNvSpPr>
+            <a:spLocks noGrp="1"/>
+          </p:cNvSpPr>
+          <p:nvPr>
+            <p:ph type="body" sz="quarter" idx="13"/>
+          </p:nvPr>
+        </p:nvSpPr>
+        <p:spPr/>
+        <p:txBody>
+          <a:bodyPr>
+            <a:normAutofit/>
+          </a:bodyPr>
+          <a:lstStyle/>
+          <a:p>
+            <a:pPr lvl="1"/>
+            <a:r>
+              <a:rPr lang="en-US" dirty="0" err="1"/>
+              <a:t>Bereinigung</a:t>
+            </a:r>
+            <a:r>
+              <a:rPr lang="en-US" dirty="0"/>
+              <a:t> der </a:t>
+            </a:r>
+            <a:r>
+              <a:rPr lang="en-US" dirty="0" err="1"/>
+              <a:t>Daten</a:t>
+            </a:r>
+            <a:r>
+              <a:rPr lang="en-US" dirty="0"/>
+              <a:t>!</a:t>
+            </a:r>
+          </a:p>
+          <a:p>
+            <a:pPr lvl="1"/>
+            <a:r>
+              <a:rPr lang="en-US" dirty="0"/>
+              <a:t>Views </a:t>
+            </a:r>
+            <a:r>
+              <a:rPr lang="en-US" dirty="0" err="1"/>
+              <a:t>erstellen</a:t>
+            </a:r>
+            <a:r>
+              <a:rPr lang="en-US" dirty="0"/>
+              <a:t>, in </a:t>
+            </a:r>
+            <a:r>
+              <a:rPr lang="en-US" dirty="0" err="1"/>
+              <a:t>denen</a:t>
+            </a:r>
+            <a:r>
+              <a:rPr lang="en-US" dirty="0"/>
+              <a:t> </a:t>
+            </a:r>
+            <a:r>
+              <a:rPr lang="en-US" dirty="0" err="1"/>
+              <a:t>Spalten</a:t>
+            </a:r>
+            <a:r>
+              <a:rPr lang="en-US" dirty="0"/>
+              <a:t> </a:t>
+            </a:r>
+            <a:r>
+              <a:rPr lang="en-US" dirty="0" err="1"/>
+              <a:t>umbenennt</a:t>
+            </a:r>
+            <a:r>
+              <a:rPr lang="en-US" dirty="0"/>
+              <a:t> </a:t>
+            </a:r>
+            <a:r>
+              <a:rPr lang="en-US" dirty="0" err="1"/>
+              <a:t>werden</a:t>
+            </a:r>
+            <a:endParaRPr lang="en-US" dirty="0"/>
+          </a:p>
+          <a:p>
+            <a:pPr lvl="2"/>
+            <a:endParaRPr lang="en-US" dirty="0"/>
+          </a:p>
+        </p:txBody>
+      </p:sp>
+      <p:sp>
+        <p:nvSpPr>
+          <p:cNvPr id="6163" name="Slide Number Placeholder 6162"/>
+          <p:cNvSpPr>
+            <a:spLocks noGrp="1"/>
+          </p:cNvSpPr>
+          <p:nvPr>
+            <p:ph type="sldNum" sz="quarter" idx="16"/>
+          </p:nvPr>
+        </p:nvSpPr>
+        <p:spPr>
+          <a:xfrm>
+            <a:off x="7416801" y="4623195"/>
+            <a:ext cx="1547813" cy="180580"/>
+          </a:xfrm>
+        </p:spPr>
+        <p:txBody>
+          <a:bodyPr/>
+          <a:lstStyle/>
+          <a:p>
+            <a:r>
+              <a:rPr lang="en-US"/>
+              <a:t>Chart </a:t>
+            </a:r>
+            <a:fld id="{91D913BA-B0D8-4B51-9328-DFAA0B370309}" type="slidenum">
+              <a:rPr lang="en-US" b="1" smtClean="0"/>
+              <a:pPr/>
+              <a:t>15</a:t>
+            </a:fld>
+            <a:endParaRPr lang="en-US" b="1" dirty="0"/>
+          </a:p>
+        </p:txBody>
+      </p:sp>
+      <p:sp>
+        <p:nvSpPr>
+          <p:cNvPr id="2" name="Date Placeholder 1"/>
+          <p:cNvSpPr>
+            <a:spLocks noGrp="1"/>
+          </p:cNvSpPr>
+          <p:nvPr>
+            <p:ph type="dt" sz="half" idx="14"/>
+          </p:nvPr>
+        </p:nvSpPr>
+        <p:spPr>
+          <a:xfrm>
+            <a:off x="7416801" y="4155928"/>
+            <a:ext cx="1547813" cy="467268"/>
+          </a:xfrm>
+        </p:spPr>
+        <p:txBody>
+          <a:bodyPr/>
+          <a:lstStyle/>
+          <a:p>
+            <a:r>
+              <a:rPr lang="en-US" dirty="0"/>
+              <a:t>Speaker, Job Description, Date if needed</a:t>
+            </a:r>
+          </a:p>
+        </p:txBody>
+      </p:sp>
+      <p:sp>
+        <p:nvSpPr>
+          <p:cNvPr id="3" name="Footer Placeholder 2"/>
+          <p:cNvSpPr>
+            <a:spLocks noGrp="1"/>
+          </p:cNvSpPr>
+          <p:nvPr>
+            <p:ph type="ftr" sz="quarter" idx="15"/>
+          </p:nvPr>
+        </p:nvSpPr>
+        <p:spPr>
+          <a:xfrm>
+            <a:off x="7416801" y="3562453"/>
+            <a:ext cx="1547813" cy="521465"/>
+          </a:xfrm>
+        </p:spPr>
+        <p:txBody>
+          <a:bodyPr/>
+          <a:lstStyle/>
+          <a:p>
+            <a:r>
+              <a:rPr lang="en-US" dirty="0"/>
+              <a:t>Presentation Title</a:t>
+            </a:r>
+          </a:p>
+        </p:txBody>
+      </p:sp>
+    </p:spTree>
+    <p:extLst>
+      <p:ext uri="{BB962C8B-B14F-4D97-AF65-F5344CB8AC3E}">
+        <p14:creationId xmlns:p14="http://schemas.microsoft.com/office/powerpoint/2010/main" val="3573956199"/>
+      </p:ext>
+    </p:extLst>
+  </p:cSld>
+  <p:clrMapOvr>
+    <a:masterClrMapping/>
+  </p:clrMapOvr>
+  <p:transition>
+    <p:fade/>
+  </p:transition>
+</p:sld>
+</file>
+
+<file path=ppt/slides/slide16.xml><?xml version="1.0" encoding="utf-8"?>
+<p:sld xmlns:a="http://schemas.openxmlformats.org/drawingml/2006/main" xmlns:r="http://schemas.openxmlformats.org/officeDocument/2006/relationships" xmlns:p="http://schemas.openxmlformats.org/presentationml/2006/main">
+  <p:cSld>
+    <p:spTree>
+      <p:nvGrpSpPr>
+        <p:cNvPr id="1" name=""/>
+        <p:cNvGrpSpPr/>
+        <p:nvPr/>
+      </p:nvGrpSpPr>
+      <p:grpSpPr>
+        <a:xfrm>
+          <a:off x="0" y="0"/>
+          <a:ext cx="0" cy="0"/>
+          <a:chOff x="0" y="0"/>
+          <a:chExt cx="0" cy="0"/>
+        </a:xfrm>
+      </p:grpSpPr>
+      <p:pic>
+        <p:nvPicPr>
+          <p:cNvPr id="8" name="Picture 2" descr="P:\Projekte\Hasso Plattner Institut\TEMPLATE_HPI_01_EXP\ppt\media\image3.jpg">
+            <a:extLst>
+              <a:ext uri="{FF2B5EF4-FFF2-40B4-BE49-F238E27FC236}">
+                <a16:creationId xmlns:a16="http://schemas.microsoft.com/office/drawing/2014/main" id="{7A0A6E39-8A9D-4521-BBEF-C1D988FD9139}"/>
+              </a:ext>
+            </a:extLst>
+          </p:cNvPr>
+          <p:cNvPicPr>
+            <a:picLocks noGrp="1" noChangeAspect="1" noChangeArrowheads="1"/>
+          </p:cNvPicPr>
+          <p:nvPr>
+            <p:ph type="pic" sz="quarter" idx="10"/>
+          </p:nvPr>
+        </p:nvPicPr>
+        <p:blipFill>
+          <a:blip r:embed="rId3">
+            <a:extLst>
+              <a:ext uri="{28A0092B-C50C-407E-A947-70E740481C1C}">
+                <a14:useLocalDpi xmlns:a14="http://schemas.microsoft.com/office/drawing/2010/main" val="0"/>
+              </a:ext>
+            </a:extLst>
+          </a:blip>
+          <a:srcRect l="47" r="47"/>
+          <a:stretch>
+            <a:fillRect/>
+          </a:stretch>
+        </p:blipFill>
+        <p:spPr>
+          <a:xfrm>
+            <a:off x="358775" y="1058863"/>
+            <a:ext cx="8605838" cy="3744912"/>
+          </a:xfrm>
+        </p:spPr>
+      </p:pic>
+      <p:sp>
+        <p:nvSpPr>
+          <p:cNvPr id="7" name="Textplatzhalter 6"/>
+          <p:cNvSpPr>
+            <a:spLocks noGrp="1"/>
+          </p:cNvSpPr>
+          <p:nvPr>
+            <p:ph type="body" sz="quarter" idx="11"/>
+          </p:nvPr>
+        </p:nvSpPr>
+        <p:spPr/>
+        <p:txBody>
+          <a:bodyPr/>
+          <a:lstStyle/>
+          <a:p>
+            <a:endParaRPr lang="de-DE" dirty="0"/>
+          </a:p>
+        </p:txBody>
+      </p:sp>
+      <p:sp>
+        <p:nvSpPr>
+          <p:cNvPr id="21" name="Title 20"/>
+          <p:cNvSpPr>
+            <a:spLocks noGrp="1"/>
+          </p:cNvSpPr>
+          <p:nvPr>
+            <p:ph type="ctrTitle"/>
+          </p:nvPr>
+        </p:nvSpPr>
+        <p:spPr/>
+        <p:txBody>
+          <a:bodyPr/>
+          <a:lstStyle/>
+          <a:p>
+            <a:r>
+              <a:rPr lang="de-DE" dirty="0" err="1"/>
+              <a:t>Thank</a:t>
+            </a:r>
+            <a:r>
+              <a:rPr lang="de-DE" dirty="0"/>
+              <a:t> </a:t>
+            </a:r>
+            <a:r>
+              <a:rPr lang="de-DE" dirty="0" err="1"/>
+              <a:t>you</a:t>
+            </a:r>
+            <a:r>
+              <a:rPr lang="de-DE" dirty="0"/>
+              <a:t> </a:t>
+            </a:r>
+            <a:br>
+              <a:rPr lang="de-DE" dirty="0"/>
+            </a:br>
+            <a:r>
+              <a:rPr lang="de-DE" dirty="0" err="1"/>
+              <a:t>for</a:t>
+            </a:r>
+            <a:r>
+              <a:rPr lang="de-DE" dirty="0"/>
+              <a:t> </a:t>
+            </a:r>
+            <a:r>
+              <a:rPr lang="de-DE" dirty="0" err="1"/>
+              <a:t>your</a:t>
+            </a:r>
+            <a:r>
+              <a:rPr lang="de-DE" dirty="0"/>
+              <a:t> </a:t>
+            </a:r>
+            <a:r>
+              <a:rPr lang="de-DE" dirty="0" err="1"/>
+              <a:t>attention</a:t>
+            </a:r>
+            <a:r>
+              <a:rPr lang="de-DE" dirty="0"/>
+              <a:t>!</a:t>
+            </a:r>
+            <a:endParaRPr lang="en-US" dirty="0"/>
+          </a:p>
+        </p:txBody>
+      </p:sp>
+      <p:sp>
+        <p:nvSpPr>
+          <p:cNvPr id="22" name="Subtitle 21"/>
+          <p:cNvSpPr>
+            <a:spLocks noGrp="1"/>
+          </p:cNvSpPr>
+          <p:nvPr>
+            <p:ph type="subTitle" idx="1"/>
+          </p:nvPr>
+        </p:nvSpPr>
+        <p:spPr/>
+        <p:txBody>
+          <a:bodyPr/>
+          <a:lstStyle/>
+          <a:p>
+            <a:r>
+              <a:rPr lang="en-US"/>
+              <a:t>Speaker</a:t>
+            </a:r>
+          </a:p>
+          <a:p>
+            <a:r>
+              <a:rPr lang="en-US"/>
+              <a:t>Job Description</a:t>
+            </a:r>
+          </a:p>
+          <a:p>
+            <a:r>
+              <a:rPr lang="en-US"/>
+              <a:t>Institute</a:t>
+            </a:r>
+            <a:endParaRPr lang="en-US" dirty="0"/>
+          </a:p>
+        </p:txBody>
+      </p:sp>
+    </p:spTree>
+    <p:extLst>
+      <p:ext uri="{BB962C8B-B14F-4D97-AF65-F5344CB8AC3E}">
+        <p14:creationId xmlns:p14="http://schemas.microsoft.com/office/powerpoint/2010/main" val="807357343"/>
+      </p:ext>
+    </p:extLst>
+  </p:cSld>
+  <p:clrMapOvr>
+    <a:masterClrMapping/>
+  </p:clrMapOvr>
+  <p:transition>
+    <p:fade/>
+  </p:transition>
+</p:sld>
+</file>
+
 <file path=ppt/slides/slide2.xml><?xml version="1.0" encoding="utf-8"?>
 <p:sld xmlns:a="http://schemas.openxmlformats.org/drawingml/2006/main" xmlns:r="http://schemas.openxmlformats.org/officeDocument/2006/relationships" xmlns:p="http://schemas.openxmlformats.org/presentationml/2006/main">
   <p:cSld>
@@ -11625,8 +13373,8 @@
           <a:lstStyle/>
           <a:p>
             <a:r>
-              <a:rPr lang="de-DE"/>
-              <a:t>Agenda</a:t>
+              <a:rPr lang="de-DE" dirty="0"/>
+              <a:t>Agenda – rausschmeißen!</a:t>
             </a:r>
             <a:endParaRPr lang="en-US" dirty="0"/>
           </a:p>
@@ -11952,34 +13700,6 @@
       </p:sp>
       <p:sp>
         <p:nvSpPr>
-          <p:cNvPr id="6158" name="Text Placeholder 6157"/>
-          <p:cNvSpPr>
-            <a:spLocks noGrp="1"/>
-          </p:cNvSpPr>
-          <p:nvPr>
-            <p:ph type="body" sz="quarter" idx="13"/>
-          </p:nvPr>
-        </p:nvSpPr>
-        <p:spPr/>
-        <p:txBody>
-          <a:bodyPr>
-            <a:normAutofit/>
-          </a:bodyPr>
-          <a:lstStyle/>
-          <a:p>
-            <a:r>
-              <a:rPr lang="en-US" dirty="0" err="1"/>
-              <a:t>Daten</a:t>
-            </a:r>
-            <a:r>
-              <a:rPr lang="en-US" dirty="0"/>
-              <a:t>: </a:t>
-            </a:r>
-          </a:p>
-        </p:txBody>
-      </p:sp>
-      <p:sp>
-        <p:nvSpPr>
           <p:cNvPr id="6163" name="Slide Number Placeholder 6162"/>
           <p:cNvSpPr>
             <a:spLocks noGrp="1"/>
@@ -12061,6 +13781,610 @@
             <a:r>
               <a:rPr lang="en-US" dirty="0"/>
               <a:t>Presentation Title</a:t>
+            </a:r>
+          </a:p>
+        </p:txBody>
+      </p:sp>
+      <p:pic>
+        <p:nvPicPr>
+          <p:cNvPr id="8" name="Grafik 7" descr="Ein Bild, das Text enthält.&#10;&#10;Automatisch generierte Beschreibung">
+            <a:extLst>
+              <a:ext uri="{FF2B5EF4-FFF2-40B4-BE49-F238E27FC236}">
+                <a16:creationId xmlns:a16="http://schemas.microsoft.com/office/drawing/2014/main" id="{1A6918FD-E183-45AA-B651-18AED0B841CA}"/>
+              </a:ext>
+            </a:extLst>
+          </p:cNvPr>
+          <p:cNvPicPr>
+            <a:picLocks noChangeAspect="1"/>
+          </p:cNvPicPr>
+          <p:nvPr/>
+        </p:nvPicPr>
+        <p:blipFill>
+          <a:blip r:embed="rId3">
+            <a:extLst>
+              <a:ext uri="{28A0092B-C50C-407E-A947-70E740481C1C}">
+                <a14:useLocalDpi xmlns:a14="http://schemas.microsoft.com/office/drawing/2010/main" val="0"/>
+              </a:ext>
+            </a:extLst>
+          </a:blip>
+          <a:stretch>
+            <a:fillRect/>
+          </a:stretch>
+        </p:blipFill>
+        <p:spPr>
+          <a:xfrm>
+            <a:off x="71141" y="1131590"/>
+            <a:ext cx="7452320" cy="3992314"/>
+          </a:xfrm>
+          <a:prstGeom prst="rect">
+            <a:avLst/>
+          </a:prstGeom>
+        </p:spPr>
+      </p:pic>
+      <p:sp>
+        <p:nvSpPr>
+          <p:cNvPr id="11" name="Rechteck 10">
+            <a:extLst>
+              <a:ext uri="{FF2B5EF4-FFF2-40B4-BE49-F238E27FC236}">
+                <a16:creationId xmlns:a16="http://schemas.microsoft.com/office/drawing/2014/main" id="{42D8DCE9-F0FD-4096-9ABC-54CC4A469013}"/>
+              </a:ext>
+            </a:extLst>
+          </p:cNvPr>
+          <p:cNvSpPr/>
+          <p:nvPr/>
+        </p:nvSpPr>
+        <p:spPr bwMode="gray">
+          <a:xfrm>
+            <a:off x="71141" y="4748387"/>
+            <a:ext cx="648072" cy="375517"/>
+          </a:xfrm>
+          <a:prstGeom prst="rect">
+            <a:avLst/>
+          </a:prstGeom>
+          <a:solidFill>
+            <a:schemeClr val="bg1"/>
+          </a:solidFill>
+          <a:ln>
+            <a:solidFill>
+              <a:schemeClr val="bg1"/>
+            </a:solidFill>
+          </a:ln>
+        </p:spPr>
+        <p:style>
+          <a:lnRef idx="2">
+            <a:schemeClr val="accent1">
+              <a:shade val="50000"/>
+            </a:schemeClr>
+          </a:lnRef>
+          <a:fillRef idx="1">
+            <a:schemeClr val="accent1"/>
+          </a:fillRef>
+          <a:effectRef idx="0">
+            <a:schemeClr val="accent1"/>
+          </a:effectRef>
+          <a:fontRef idx="minor">
+            <a:schemeClr val="lt1"/>
+          </a:fontRef>
+        </p:style>
+        <p:txBody>
+          <a:bodyPr rot="0" spcFirstLastPara="0" vertOverflow="overflow" horzOverflow="overflow" vert="horz" wrap="square" lIns="108000" tIns="72000" rIns="108000" bIns="72000" numCol="1" spcCol="0" rtlCol="0" fromWordArt="0" anchor="ctr" anchorCtr="0" forceAA="0" compatLnSpc="1">
+            <a:prstTxWarp prst="textNoShape">
+              <a:avLst/>
+            </a:prstTxWarp>
+            <a:noAutofit/>
+          </a:bodyPr>
+          <a:lstStyle/>
+          <a:p>
+            <a:pPr algn="ctr">
+              <a:spcBef>
+                <a:spcPts val="300"/>
+              </a:spcBef>
+              <a:spcAft>
+                <a:spcPts val="300"/>
+              </a:spcAft>
+            </a:pPr>
+            <a:endParaRPr lang="de-DE" sz="1200" b="1" dirty="0" err="1">
+              <a:solidFill>
+                <a:schemeClr val="bg1"/>
+              </a:solidFill>
+            </a:endParaRPr>
+          </a:p>
+        </p:txBody>
+      </p:sp>
+      <p:sp>
+        <p:nvSpPr>
+          <p:cNvPr id="12" name="Rechteck 11">
+            <a:extLst>
+              <a:ext uri="{FF2B5EF4-FFF2-40B4-BE49-F238E27FC236}">
+                <a16:creationId xmlns:a16="http://schemas.microsoft.com/office/drawing/2014/main" id="{A06089FC-39B9-4349-9F79-42BB61CD2AF2}"/>
+              </a:ext>
+            </a:extLst>
+          </p:cNvPr>
+          <p:cNvSpPr/>
+          <p:nvPr/>
+        </p:nvSpPr>
+        <p:spPr bwMode="gray">
+          <a:xfrm>
+            <a:off x="1979712" y="3823185"/>
+            <a:ext cx="2736304" cy="1212314"/>
+          </a:xfrm>
+          <a:prstGeom prst="rect">
+            <a:avLst/>
+          </a:prstGeom>
+          <a:noFill/>
+          <a:ln>
+            <a:solidFill>
+              <a:schemeClr val="accent1"/>
+            </a:solidFill>
+          </a:ln>
+        </p:spPr>
+        <p:style>
+          <a:lnRef idx="2">
+            <a:schemeClr val="accent1">
+              <a:shade val="50000"/>
+            </a:schemeClr>
+          </a:lnRef>
+          <a:fillRef idx="1">
+            <a:schemeClr val="accent1"/>
+          </a:fillRef>
+          <a:effectRef idx="0">
+            <a:schemeClr val="accent1"/>
+          </a:effectRef>
+          <a:fontRef idx="minor">
+            <a:schemeClr val="lt1"/>
+          </a:fontRef>
+        </p:style>
+        <p:txBody>
+          <a:bodyPr rot="0" spcFirstLastPara="0" vertOverflow="overflow" horzOverflow="overflow" vert="horz" wrap="square" lIns="108000" tIns="72000" rIns="108000" bIns="72000" numCol="1" spcCol="0" rtlCol="0" fromWordArt="0" anchor="ctr" anchorCtr="0" forceAA="0" compatLnSpc="1">
+            <a:prstTxWarp prst="textNoShape">
+              <a:avLst/>
+            </a:prstTxWarp>
+            <a:noAutofit/>
+          </a:bodyPr>
+          <a:lstStyle/>
+          <a:p>
+            <a:pPr algn="ctr">
+              <a:spcBef>
+                <a:spcPts val="300"/>
+              </a:spcBef>
+              <a:spcAft>
+                <a:spcPts val="300"/>
+              </a:spcAft>
+            </a:pPr>
+            <a:endParaRPr lang="de-DE" sz="1200" b="1" dirty="0" err="1">
+              <a:solidFill>
+                <a:schemeClr val="bg1"/>
+              </a:solidFill>
+            </a:endParaRPr>
+          </a:p>
+        </p:txBody>
+      </p:sp>
+      <p:sp>
+        <p:nvSpPr>
+          <p:cNvPr id="16" name="Rechteck 15">
+            <a:extLst>
+              <a:ext uri="{FF2B5EF4-FFF2-40B4-BE49-F238E27FC236}">
+                <a16:creationId xmlns:a16="http://schemas.microsoft.com/office/drawing/2014/main" id="{6B9362DA-6C7B-4571-8AE0-49ACB9CB33A5}"/>
+              </a:ext>
+            </a:extLst>
+          </p:cNvPr>
+          <p:cNvSpPr/>
+          <p:nvPr/>
+        </p:nvSpPr>
+        <p:spPr bwMode="gray">
+          <a:xfrm>
+            <a:off x="1949302" y="1224125"/>
+            <a:ext cx="3126754" cy="835556"/>
+          </a:xfrm>
+          <a:prstGeom prst="rect">
+            <a:avLst/>
+          </a:prstGeom>
+          <a:noFill/>
+          <a:ln>
+            <a:solidFill>
+              <a:schemeClr val="accent4"/>
+            </a:solidFill>
+          </a:ln>
+        </p:spPr>
+        <p:style>
+          <a:lnRef idx="2">
+            <a:schemeClr val="accent1">
+              <a:shade val="50000"/>
+            </a:schemeClr>
+          </a:lnRef>
+          <a:fillRef idx="1">
+            <a:schemeClr val="accent1"/>
+          </a:fillRef>
+          <a:effectRef idx="0">
+            <a:schemeClr val="accent1"/>
+          </a:effectRef>
+          <a:fontRef idx="minor">
+            <a:schemeClr val="lt1"/>
+          </a:fontRef>
+        </p:style>
+        <p:txBody>
+          <a:bodyPr rot="0" spcFirstLastPara="0" vertOverflow="overflow" horzOverflow="overflow" vert="horz" wrap="square" lIns="108000" tIns="72000" rIns="108000" bIns="72000" numCol="1" spcCol="0" rtlCol="0" fromWordArt="0" anchor="ctr" anchorCtr="0" forceAA="0" compatLnSpc="1">
+            <a:prstTxWarp prst="textNoShape">
+              <a:avLst/>
+            </a:prstTxWarp>
+            <a:noAutofit/>
+          </a:bodyPr>
+          <a:lstStyle/>
+          <a:p>
+            <a:pPr algn="ctr">
+              <a:spcBef>
+                <a:spcPts val="300"/>
+              </a:spcBef>
+              <a:spcAft>
+                <a:spcPts val="300"/>
+              </a:spcAft>
+            </a:pPr>
+            <a:endParaRPr lang="de-DE" sz="1200" b="1" dirty="0" err="1">
+              <a:solidFill>
+                <a:schemeClr val="bg1"/>
+              </a:solidFill>
+            </a:endParaRPr>
+          </a:p>
+        </p:txBody>
+      </p:sp>
+      <p:sp>
+        <p:nvSpPr>
+          <p:cNvPr id="18" name="Rechteck 17">
+            <a:extLst>
+              <a:ext uri="{FF2B5EF4-FFF2-40B4-BE49-F238E27FC236}">
+                <a16:creationId xmlns:a16="http://schemas.microsoft.com/office/drawing/2014/main" id="{43661586-6532-4CDC-BBB2-37EB94D1F72F}"/>
+              </a:ext>
+            </a:extLst>
+          </p:cNvPr>
+          <p:cNvSpPr/>
+          <p:nvPr/>
+        </p:nvSpPr>
+        <p:spPr bwMode="gray">
+          <a:xfrm>
+            <a:off x="107504" y="1215926"/>
+            <a:ext cx="1800200" cy="3532461"/>
+          </a:xfrm>
+          <a:prstGeom prst="rect">
+            <a:avLst/>
+          </a:prstGeom>
+          <a:noFill/>
+          <a:ln>
+            <a:solidFill>
+              <a:schemeClr val="accent4"/>
+            </a:solidFill>
+          </a:ln>
+        </p:spPr>
+        <p:style>
+          <a:lnRef idx="2">
+            <a:schemeClr val="accent1">
+              <a:shade val="50000"/>
+            </a:schemeClr>
+          </a:lnRef>
+          <a:fillRef idx="1">
+            <a:schemeClr val="accent1"/>
+          </a:fillRef>
+          <a:effectRef idx="0">
+            <a:schemeClr val="accent1"/>
+          </a:effectRef>
+          <a:fontRef idx="minor">
+            <a:schemeClr val="lt1"/>
+          </a:fontRef>
+        </p:style>
+        <p:txBody>
+          <a:bodyPr rot="0" spcFirstLastPara="0" vertOverflow="overflow" horzOverflow="overflow" vert="horz" wrap="square" lIns="108000" tIns="72000" rIns="108000" bIns="72000" numCol="1" spcCol="0" rtlCol="0" fromWordArt="0" anchor="ctr" anchorCtr="0" forceAA="0" compatLnSpc="1">
+            <a:prstTxWarp prst="textNoShape">
+              <a:avLst/>
+            </a:prstTxWarp>
+            <a:noAutofit/>
+          </a:bodyPr>
+          <a:lstStyle/>
+          <a:p>
+            <a:pPr algn="ctr">
+              <a:spcBef>
+                <a:spcPts val="300"/>
+              </a:spcBef>
+              <a:spcAft>
+                <a:spcPts val="300"/>
+              </a:spcAft>
+            </a:pPr>
+            <a:endParaRPr lang="de-DE" sz="1200" b="1" dirty="0" err="1">
+              <a:solidFill>
+                <a:schemeClr val="bg1"/>
+              </a:solidFill>
+            </a:endParaRPr>
+          </a:p>
+        </p:txBody>
+      </p:sp>
+      <p:sp>
+        <p:nvSpPr>
+          <p:cNvPr id="19" name="Rechteck 18">
+            <a:extLst>
+              <a:ext uri="{FF2B5EF4-FFF2-40B4-BE49-F238E27FC236}">
+                <a16:creationId xmlns:a16="http://schemas.microsoft.com/office/drawing/2014/main" id="{1FB45968-A64D-479C-A5F2-6A3BD3CE5A96}"/>
+              </a:ext>
+            </a:extLst>
+          </p:cNvPr>
+          <p:cNvSpPr/>
+          <p:nvPr/>
+        </p:nvSpPr>
+        <p:spPr bwMode="gray">
+          <a:xfrm>
+            <a:off x="1944067" y="2139702"/>
+            <a:ext cx="3126754" cy="1647800"/>
+          </a:xfrm>
+          <a:prstGeom prst="rect">
+            <a:avLst/>
+          </a:prstGeom>
+          <a:noFill/>
+          <a:ln>
+            <a:solidFill>
+              <a:srgbClr val="FFC000"/>
+            </a:solidFill>
+          </a:ln>
+        </p:spPr>
+        <p:style>
+          <a:lnRef idx="2">
+            <a:schemeClr val="accent1">
+              <a:shade val="50000"/>
+            </a:schemeClr>
+          </a:lnRef>
+          <a:fillRef idx="1">
+            <a:schemeClr val="accent1"/>
+          </a:fillRef>
+          <a:effectRef idx="0">
+            <a:schemeClr val="accent1"/>
+          </a:effectRef>
+          <a:fontRef idx="minor">
+            <a:schemeClr val="lt1"/>
+          </a:fontRef>
+        </p:style>
+        <p:txBody>
+          <a:bodyPr rot="0" spcFirstLastPara="0" vertOverflow="overflow" horzOverflow="overflow" vert="horz" wrap="square" lIns="108000" tIns="72000" rIns="108000" bIns="72000" numCol="1" spcCol="0" rtlCol="0" fromWordArt="0" anchor="ctr" anchorCtr="0" forceAA="0" compatLnSpc="1">
+            <a:prstTxWarp prst="textNoShape">
+              <a:avLst/>
+            </a:prstTxWarp>
+            <a:noAutofit/>
+          </a:bodyPr>
+          <a:lstStyle/>
+          <a:p>
+            <a:pPr algn="ctr">
+              <a:spcBef>
+                <a:spcPts val="300"/>
+              </a:spcBef>
+              <a:spcAft>
+                <a:spcPts val="300"/>
+              </a:spcAft>
+            </a:pPr>
+            <a:endParaRPr lang="de-DE" sz="1200" b="1" dirty="0" err="1">
+              <a:solidFill>
+                <a:schemeClr val="bg1"/>
+              </a:solidFill>
+            </a:endParaRPr>
+          </a:p>
+        </p:txBody>
+      </p:sp>
+      <p:sp>
+        <p:nvSpPr>
+          <p:cNvPr id="20" name="Rechteck 19">
+            <a:extLst>
+              <a:ext uri="{FF2B5EF4-FFF2-40B4-BE49-F238E27FC236}">
+                <a16:creationId xmlns:a16="http://schemas.microsoft.com/office/drawing/2014/main" id="{9FD2E06C-2421-477B-A1B0-E92CA5A27BB5}"/>
+              </a:ext>
+            </a:extLst>
+          </p:cNvPr>
+          <p:cNvSpPr/>
+          <p:nvPr/>
+        </p:nvSpPr>
+        <p:spPr bwMode="gray">
+          <a:xfrm>
+            <a:off x="5117284" y="1224125"/>
+            <a:ext cx="2335036" cy="3399070"/>
+          </a:xfrm>
+          <a:prstGeom prst="rect">
+            <a:avLst/>
+          </a:prstGeom>
+          <a:noFill/>
+          <a:ln>
+            <a:solidFill>
+              <a:srgbClr val="FFC000"/>
+            </a:solidFill>
+          </a:ln>
+        </p:spPr>
+        <p:style>
+          <a:lnRef idx="2">
+            <a:schemeClr val="accent1">
+              <a:shade val="50000"/>
+            </a:schemeClr>
+          </a:lnRef>
+          <a:fillRef idx="1">
+            <a:schemeClr val="accent1"/>
+          </a:fillRef>
+          <a:effectRef idx="0">
+            <a:schemeClr val="accent1"/>
+          </a:effectRef>
+          <a:fontRef idx="minor">
+            <a:schemeClr val="lt1"/>
+          </a:fontRef>
+        </p:style>
+        <p:txBody>
+          <a:bodyPr rot="0" spcFirstLastPara="0" vertOverflow="overflow" horzOverflow="overflow" vert="horz" wrap="square" lIns="108000" tIns="72000" rIns="108000" bIns="72000" numCol="1" spcCol="0" rtlCol="0" fromWordArt="0" anchor="ctr" anchorCtr="0" forceAA="0" compatLnSpc="1">
+            <a:prstTxWarp prst="textNoShape">
+              <a:avLst/>
+            </a:prstTxWarp>
+            <a:noAutofit/>
+          </a:bodyPr>
+          <a:lstStyle/>
+          <a:p>
+            <a:pPr algn="ctr">
+              <a:spcBef>
+                <a:spcPts val="300"/>
+              </a:spcBef>
+              <a:spcAft>
+                <a:spcPts val="300"/>
+              </a:spcAft>
+            </a:pPr>
+            <a:endParaRPr lang="de-DE" sz="1200" b="1" dirty="0" err="1">
+              <a:solidFill>
+                <a:schemeClr val="bg1"/>
+              </a:solidFill>
+            </a:endParaRPr>
+          </a:p>
+        </p:txBody>
+      </p:sp>
+      <p:sp>
+        <p:nvSpPr>
+          <p:cNvPr id="13" name="Textfeld 12">
+            <a:extLst>
+              <a:ext uri="{FF2B5EF4-FFF2-40B4-BE49-F238E27FC236}">
+                <a16:creationId xmlns:a16="http://schemas.microsoft.com/office/drawing/2014/main" id="{65F4837D-0662-4F9E-8851-02064967BA49}"/>
+              </a:ext>
+            </a:extLst>
+          </p:cNvPr>
+          <p:cNvSpPr txBox="1"/>
+          <p:nvPr/>
+        </p:nvSpPr>
+        <p:spPr bwMode="gray">
+          <a:xfrm>
+            <a:off x="1411645" y="1215926"/>
+            <a:ext cx="576064" cy="360040"/>
+          </a:xfrm>
+          <a:prstGeom prst="rect">
+            <a:avLst/>
+          </a:prstGeom>
+          <a:noFill/>
+        </p:spPr>
+        <p:txBody>
+          <a:bodyPr wrap="square" lIns="0" tIns="0" rIns="0" bIns="0" rtlCol="0">
+            <a:noAutofit/>
+          </a:bodyPr>
+          <a:lstStyle/>
+          <a:p>
+            <a:pPr>
+              <a:spcBef>
+                <a:spcPts val="300"/>
+              </a:spcBef>
+              <a:spcAft>
+                <a:spcPts val="300"/>
+              </a:spcAft>
+              <a:buClr>
+                <a:schemeClr val="accent1"/>
+              </a:buClr>
+              <a:buSzPct val="90000"/>
+            </a:pPr>
+            <a:r>
+              <a:rPr lang="de-DE" sz="1200" b="1" dirty="0">
+                <a:solidFill>
+                  <a:schemeClr val="accent4"/>
+                </a:solidFill>
+              </a:rPr>
+              <a:t>WDI</a:t>
+            </a:r>
+          </a:p>
+        </p:txBody>
+      </p:sp>
+      <p:sp>
+        <p:nvSpPr>
+          <p:cNvPr id="22" name="Textfeld 21">
+            <a:extLst>
+              <a:ext uri="{FF2B5EF4-FFF2-40B4-BE49-F238E27FC236}">
+                <a16:creationId xmlns:a16="http://schemas.microsoft.com/office/drawing/2014/main" id="{C0BB4230-75B0-410D-B559-CB8C3BEFAC26}"/>
+              </a:ext>
+            </a:extLst>
+          </p:cNvPr>
+          <p:cNvSpPr txBox="1"/>
+          <p:nvPr/>
+        </p:nvSpPr>
+        <p:spPr bwMode="gray">
+          <a:xfrm>
+            <a:off x="4532592" y="2211710"/>
+            <a:ext cx="576064" cy="360040"/>
+          </a:xfrm>
+          <a:prstGeom prst="rect">
+            <a:avLst/>
+          </a:prstGeom>
+          <a:noFill/>
+        </p:spPr>
+        <p:txBody>
+          <a:bodyPr wrap="square" lIns="0" tIns="0" rIns="0" bIns="0" rtlCol="0">
+            <a:noAutofit/>
+          </a:bodyPr>
+          <a:lstStyle/>
+          <a:p>
+            <a:pPr>
+              <a:spcBef>
+                <a:spcPts val="300"/>
+              </a:spcBef>
+              <a:spcAft>
+                <a:spcPts val="300"/>
+              </a:spcAft>
+              <a:buClr>
+                <a:schemeClr val="accent1"/>
+              </a:buClr>
+              <a:buSzPct val="90000"/>
+            </a:pPr>
+            <a:r>
+              <a:rPr lang="de-DE" sz="1200" b="1" dirty="0" err="1">
+                <a:solidFill>
+                  <a:schemeClr val="accent3"/>
+                </a:solidFill>
+              </a:rPr>
+              <a:t>GHDx</a:t>
+            </a:r>
+            <a:endParaRPr lang="de-DE" sz="1200" b="1" dirty="0">
+              <a:solidFill>
+                <a:schemeClr val="accent3"/>
+              </a:solidFill>
+            </a:endParaRPr>
+          </a:p>
+        </p:txBody>
+      </p:sp>
+      <p:sp>
+        <p:nvSpPr>
+          <p:cNvPr id="23" name="Textfeld 22">
+            <a:extLst>
+              <a:ext uri="{FF2B5EF4-FFF2-40B4-BE49-F238E27FC236}">
+                <a16:creationId xmlns:a16="http://schemas.microsoft.com/office/drawing/2014/main" id="{74B31F8F-8D55-4DF4-A976-2BD177F0B81F}"/>
+              </a:ext>
+            </a:extLst>
+          </p:cNvPr>
+          <p:cNvSpPr txBox="1"/>
+          <p:nvPr/>
+        </p:nvSpPr>
+        <p:spPr bwMode="gray">
+          <a:xfrm>
+            <a:off x="4211960" y="4812573"/>
+            <a:ext cx="576064" cy="360040"/>
+          </a:xfrm>
+          <a:prstGeom prst="rect">
+            <a:avLst/>
+          </a:prstGeom>
+          <a:noFill/>
+        </p:spPr>
+        <p:txBody>
+          <a:bodyPr wrap="square" lIns="0" tIns="0" rIns="0" bIns="0" rtlCol="0">
+            <a:noAutofit/>
+          </a:bodyPr>
+          <a:lstStyle/>
+          <a:p>
+            <a:pPr>
+              <a:spcBef>
+                <a:spcPts val="300"/>
+              </a:spcBef>
+              <a:spcAft>
+                <a:spcPts val="300"/>
+              </a:spcAft>
+              <a:buClr>
+                <a:schemeClr val="accent1"/>
+              </a:buClr>
+              <a:buSzPct val="90000"/>
+            </a:pPr>
+            <a:r>
+              <a:rPr lang="de-DE" sz="1200" b="1" dirty="0">
+                <a:solidFill>
+                  <a:schemeClr val="accent1"/>
+                </a:solidFill>
+              </a:rPr>
+              <a:t>IHME</a:t>
             </a:r>
           </a:p>
         </p:txBody>
@@ -12139,32 +14463,6 @@
       </p:sp>
       <p:sp>
         <p:nvSpPr>
-          <p:cNvPr id="6158" name="Text Placeholder 6157"/>
-          <p:cNvSpPr>
-            <a:spLocks noGrp="1"/>
-          </p:cNvSpPr>
-          <p:nvPr>
-            <p:ph type="body" sz="quarter" idx="13"/>
-          </p:nvPr>
-        </p:nvSpPr>
-        <p:spPr>
-          <a:xfrm>
-            <a:off x="358776" y="1239837"/>
-            <a:ext cx="6877051" cy="683841"/>
-          </a:xfrm>
-        </p:spPr>
-        <p:txBody>
-          <a:bodyPr>
-            <a:normAutofit/>
-          </a:bodyPr>
-          <a:lstStyle/>
-          <a:p>
-            <a:endParaRPr lang="en-US" dirty="0"/>
-          </a:p>
-        </p:txBody>
-      </p:sp>
-      <p:sp>
-        <p:nvSpPr>
           <p:cNvPr id="6163" name="Slide Number Placeholder 6162"/>
           <p:cNvSpPr>
             <a:spLocks noGrp="1"/>
@@ -12270,7 +14568,18 @@
           <a:prstGeom prst="flowChartPunchedCard">
             <a:avLst/>
           </a:prstGeom>
-          <a:ln/>
+          <a:ln>
+            <a:solidFill>
+              <a:schemeClr val="accent3"/>
+            </a:solidFill>
+          </a:ln>
+          <a:effectLst>
+            <a:outerShdw blurRad="50800" dist="38100" dir="2700000" algn="tl" rotWithShape="0">
+              <a:prstClr val="black">
+                <a:alpha val="40000"/>
+              </a:prstClr>
+            </a:outerShdw>
+          </a:effectLst>
         </p:spPr>
         <p:style>
           <a:lnRef idx="2">
@@ -12347,7 +14656,18 @@
           <a:prstGeom prst="flowChartPunchedCard">
             <a:avLst/>
           </a:prstGeom>
-          <a:ln/>
+          <a:ln>
+            <a:solidFill>
+              <a:schemeClr val="accent3"/>
+            </a:solidFill>
+          </a:ln>
+          <a:effectLst>
+            <a:outerShdw blurRad="50800" dist="38100" dir="2700000" algn="tl" rotWithShape="0">
+              <a:prstClr val="black">
+                <a:alpha val="40000"/>
+              </a:prstClr>
+            </a:outerShdw>
+          </a:effectLst>
         </p:spPr>
         <p:style>
           <a:lnRef idx="2">
@@ -12424,7 +14744,18 @@
           <a:prstGeom prst="flowChartPunchedCard">
             <a:avLst/>
           </a:prstGeom>
-          <a:ln/>
+          <a:ln>
+            <a:solidFill>
+              <a:schemeClr val="accent3"/>
+            </a:solidFill>
+          </a:ln>
+          <a:effectLst>
+            <a:outerShdw blurRad="50800" dist="38100" dir="2700000" algn="tl" rotWithShape="0">
+              <a:prstClr val="black">
+                <a:alpha val="40000"/>
+              </a:prstClr>
+            </a:outerShdw>
+          </a:effectLst>
         </p:spPr>
         <p:style>
           <a:lnRef idx="2">
@@ -12506,6 +14837,13 @@
               <a:schemeClr val="accent4"/>
             </a:solidFill>
           </a:ln>
+          <a:effectLst>
+            <a:outerShdw blurRad="50800" dist="38100" dir="2700000" algn="tl" rotWithShape="0">
+              <a:prstClr val="black">
+                <a:alpha val="40000"/>
+              </a:prstClr>
+            </a:outerShdw>
+          </a:effectLst>
         </p:spPr>
         <p:style>
           <a:lnRef idx="2">
@@ -12587,6 +14925,13 @@
               <a:schemeClr val="accent4"/>
             </a:solidFill>
           </a:ln>
+          <a:effectLst>
+            <a:outerShdw blurRad="50800" dist="38100" dir="2700000" algn="tl" rotWithShape="0">
+              <a:prstClr val="black">
+                <a:alpha val="40000"/>
+              </a:prstClr>
+            </a:outerShdw>
+          </a:effectLst>
         </p:spPr>
         <p:style>
           <a:lnRef idx="2">
@@ -12668,6 +15013,13 @@
               <a:schemeClr val="accent4"/>
             </a:solidFill>
           </a:ln>
+          <a:effectLst>
+            <a:outerShdw blurRad="50800" dist="38100" dir="2700000" algn="tl" rotWithShape="0">
+              <a:prstClr val="black">
+                <a:alpha val="40000"/>
+              </a:prstClr>
+            </a:outerShdw>
+          </a:effectLst>
         </p:spPr>
         <p:style>
           <a:lnRef idx="2">
@@ -12749,6 +15101,13 @@
               <a:schemeClr val="accent1"/>
             </a:solidFill>
           </a:ln>
+          <a:effectLst>
+            <a:outerShdw blurRad="50800" dist="38100" dir="2700000" algn="tl" rotWithShape="0">
+              <a:prstClr val="black">
+                <a:alpha val="40000"/>
+              </a:prstClr>
+            </a:outerShdw>
+          </a:effectLst>
         </p:spPr>
         <p:style>
           <a:lnRef idx="2">
@@ -12830,6 +15189,13 @@
               <a:schemeClr val="accent1"/>
             </a:solidFill>
           </a:ln>
+          <a:effectLst>
+            <a:outerShdw blurRad="50800" dist="38100" dir="2700000" algn="tl" rotWithShape="0">
+              <a:prstClr val="black">
+                <a:alpha val="40000"/>
+              </a:prstClr>
+            </a:outerShdw>
+          </a:effectLst>
         </p:spPr>
         <p:style>
           <a:lnRef idx="2">
@@ -12900,7 +15266,7 @@
         </p:nvSpPr>
         <p:spPr bwMode="gray">
           <a:xfrm>
-            <a:off x="710978" y="4209688"/>
+            <a:off x="710978" y="4227934"/>
             <a:ext cx="611671" cy="546065"/>
           </a:xfrm>
           <a:prstGeom prst="flowChartPunchedCard">
@@ -12911,6 +15277,13 @@
               <a:schemeClr val="accent1"/>
             </a:solidFill>
           </a:ln>
+          <a:effectLst>
+            <a:outerShdw blurRad="50800" dist="38100" dir="2700000" algn="tl" rotWithShape="0">
+              <a:prstClr val="black">
+                <a:alpha val="40000"/>
+              </a:prstClr>
+            </a:outerShdw>
+          </a:effectLst>
         </p:spPr>
         <p:style>
           <a:lnRef idx="2">
@@ -12964,6 +15337,1233 @@
                 <a:schemeClr val="tx1"/>
               </a:solidFill>
             </a:endParaRPr>
+          </a:p>
+        </p:txBody>
+      </p:sp>
+      <p:sp>
+        <p:nvSpPr>
+          <p:cNvPr id="5" name="Rechteck: abgerundete Ecken 4">
+            <a:extLst>
+              <a:ext uri="{FF2B5EF4-FFF2-40B4-BE49-F238E27FC236}">
+                <a16:creationId xmlns:a16="http://schemas.microsoft.com/office/drawing/2014/main" id="{5B16970C-B475-4BE7-AD6F-D4CD89D117AD}"/>
+              </a:ext>
+            </a:extLst>
+          </p:cNvPr>
+          <p:cNvSpPr/>
+          <p:nvPr/>
+        </p:nvSpPr>
+        <p:spPr bwMode="gray">
+          <a:xfrm>
+            <a:off x="2124520" y="4209688"/>
+            <a:ext cx="720080" cy="455811"/>
+          </a:xfrm>
+          <a:prstGeom prst="roundRect">
+            <a:avLst/>
+          </a:prstGeom>
+          <a:solidFill>
+            <a:schemeClr val="bg1"/>
+          </a:solidFill>
+          <a:ln>
+            <a:solidFill>
+              <a:schemeClr val="accent1"/>
+            </a:solidFill>
+          </a:ln>
+        </p:spPr>
+        <p:style>
+          <a:lnRef idx="2">
+            <a:schemeClr val="accent1">
+              <a:shade val="50000"/>
+            </a:schemeClr>
+          </a:lnRef>
+          <a:fillRef idx="1">
+            <a:schemeClr val="accent1"/>
+          </a:fillRef>
+          <a:effectRef idx="0">
+            <a:schemeClr val="accent1"/>
+          </a:effectRef>
+          <a:fontRef idx="minor">
+            <a:schemeClr val="lt1"/>
+          </a:fontRef>
+        </p:style>
+        <p:txBody>
+          <a:bodyPr rot="0" spcFirstLastPara="0" vertOverflow="overflow" horzOverflow="overflow" vert="horz" wrap="square" lIns="108000" tIns="72000" rIns="108000" bIns="72000" numCol="1" spcCol="0" rtlCol="0" fromWordArt="0" anchor="ctr" anchorCtr="0" forceAA="0" compatLnSpc="1">
+            <a:prstTxWarp prst="textNoShape">
+              <a:avLst/>
+            </a:prstTxWarp>
+            <a:noAutofit/>
+          </a:bodyPr>
+          <a:lstStyle/>
+          <a:p>
+            <a:pPr algn="ctr">
+              <a:spcBef>
+                <a:spcPts val="300"/>
+              </a:spcBef>
+              <a:spcAft>
+                <a:spcPts val="300"/>
+              </a:spcAft>
+            </a:pPr>
+            <a:endParaRPr lang="de-DE" sz="1200" b="1" dirty="0" err="1">
+              <a:solidFill>
+                <a:schemeClr val="bg1"/>
+              </a:solidFill>
+            </a:endParaRPr>
+          </a:p>
+        </p:txBody>
+      </p:sp>
+      <p:sp>
+        <p:nvSpPr>
+          <p:cNvPr id="22" name="Rechteck: abgerundete Ecken 21">
+            <a:extLst>
+              <a:ext uri="{FF2B5EF4-FFF2-40B4-BE49-F238E27FC236}">
+                <a16:creationId xmlns:a16="http://schemas.microsoft.com/office/drawing/2014/main" id="{0EFF3F2C-382E-45F1-853B-3899C665974B}"/>
+              </a:ext>
+            </a:extLst>
+          </p:cNvPr>
+          <p:cNvSpPr/>
+          <p:nvPr/>
+        </p:nvSpPr>
+        <p:spPr bwMode="gray">
+          <a:xfrm>
+            <a:off x="2131126" y="3224140"/>
+            <a:ext cx="720080" cy="455811"/>
+          </a:xfrm>
+          <a:prstGeom prst="roundRect">
+            <a:avLst/>
+          </a:prstGeom>
+          <a:solidFill>
+            <a:schemeClr val="bg1"/>
+          </a:solidFill>
+          <a:ln>
+            <a:solidFill>
+              <a:schemeClr val="accent4"/>
+            </a:solidFill>
+          </a:ln>
+        </p:spPr>
+        <p:style>
+          <a:lnRef idx="2">
+            <a:schemeClr val="accent1">
+              <a:shade val="50000"/>
+            </a:schemeClr>
+          </a:lnRef>
+          <a:fillRef idx="1">
+            <a:schemeClr val="accent1"/>
+          </a:fillRef>
+          <a:effectRef idx="0">
+            <a:schemeClr val="accent1"/>
+          </a:effectRef>
+          <a:fontRef idx="minor">
+            <a:schemeClr val="lt1"/>
+          </a:fontRef>
+        </p:style>
+        <p:txBody>
+          <a:bodyPr rot="0" spcFirstLastPara="0" vertOverflow="overflow" horzOverflow="overflow" vert="horz" wrap="square" lIns="108000" tIns="72000" rIns="108000" bIns="72000" numCol="1" spcCol="0" rtlCol="0" fromWordArt="0" anchor="ctr" anchorCtr="0" forceAA="0" compatLnSpc="1">
+            <a:prstTxWarp prst="textNoShape">
+              <a:avLst/>
+            </a:prstTxWarp>
+            <a:noAutofit/>
+          </a:bodyPr>
+          <a:lstStyle/>
+          <a:p>
+            <a:pPr algn="ctr">
+              <a:spcBef>
+                <a:spcPts val="300"/>
+              </a:spcBef>
+              <a:spcAft>
+                <a:spcPts val="300"/>
+              </a:spcAft>
+            </a:pPr>
+            <a:endParaRPr lang="de-DE" sz="1200" b="1" dirty="0" err="1">
+              <a:solidFill>
+                <a:schemeClr val="bg1"/>
+              </a:solidFill>
+            </a:endParaRPr>
+          </a:p>
+        </p:txBody>
+      </p:sp>
+      <p:cxnSp>
+        <p:nvCxnSpPr>
+          <p:cNvPr id="23" name="Gerader Verbinder 22">
+            <a:extLst>
+              <a:ext uri="{FF2B5EF4-FFF2-40B4-BE49-F238E27FC236}">
+                <a16:creationId xmlns:a16="http://schemas.microsoft.com/office/drawing/2014/main" id="{D7CEFE36-09B1-4F0C-913B-9D716B215D9C}"/>
+              </a:ext>
+            </a:extLst>
+          </p:cNvPr>
+          <p:cNvCxnSpPr>
+            <a:cxnSpLocks/>
+          </p:cNvCxnSpPr>
+          <p:nvPr/>
+        </p:nvCxnSpPr>
+        <p:spPr bwMode="gray">
+          <a:xfrm>
+            <a:off x="4548811" y="1716038"/>
+            <a:ext cx="0" cy="3111806"/>
+          </a:xfrm>
+          <a:prstGeom prst="line">
+            <a:avLst/>
+          </a:prstGeom>
+          <a:ln>
+            <a:prstDash val="lgDash"/>
+          </a:ln>
+        </p:spPr>
+        <p:style>
+          <a:lnRef idx="2">
+            <a:schemeClr val="accent5"/>
+          </a:lnRef>
+          <a:fillRef idx="0">
+            <a:schemeClr val="accent5"/>
+          </a:fillRef>
+          <a:effectRef idx="1">
+            <a:schemeClr val="accent5"/>
+          </a:effectRef>
+          <a:fontRef idx="minor">
+            <a:schemeClr val="tx1"/>
+          </a:fontRef>
+        </p:style>
+      </p:cxnSp>
+      <p:sp>
+        <p:nvSpPr>
+          <p:cNvPr id="31" name="Rechteck: abgerundete Ecken 30">
+            <a:extLst>
+              <a:ext uri="{FF2B5EF4-FFF2-40B4-BE49-F238E27FC236}">
+                <a16:creationId xmlns:a16="http://schemas.microsoft.com/office/drawing/2014/main" id="{966E356E-D06C-450F-8CF6-1575C6413BB1}"/>
+              </a:ext>
+            </a:extLst>
+          </p:cNvPr>
+          <p:cNvSpPr/>
+          <p:nvPr/>
+        </p:nvSpPr>
+        <p:spPr bwMode="gray">
+          <a:xfrm>
+            <a:off x="5028458" y="3224140"/>
+            <a:ext cx="720080" cy="455811"/>
+          </a:xfrm>
+          <a:prstGeom prst="roundRect">
+            <a:avLst/>
+          </a:prstGeom>
+          <a:solidFill>
+            <a:schemeClr val="bg1"/>
+          </a:solidFill>
+          <a:ln>
+            <a:solidFill>
+              <a:schemeClr val="accent4"/>
+            </a:solidFill>
+          </a:ln>
+        </p:spPr>
+        <p:style>
+          <a:lnRef idx="2">
+            <a:schemeClr val="accent1">
+              <a:shade val="50000"/>
+            </a:schemeClr>
+          </a:lnRef>
+          <a:fillRef idx="1">
+            <a:schemeClr val="accent1"/>
+          </a:fillRef>
+          <a:effectRef idx="0">
+            <a:schemeClr val="accent1"/>
+          </a:effectRef>
+          <a:fontRef idx="minor">
+            <a:schemeClr val="lt1"/>
+          </a:fontRef>
+        </p:style>
+        <p:txBody>
+          <a:bodyPr rot="0" spcFirstLastPara="0" vertOverflow="overflow" horzOverflow="overflow" vert="horz" wrap="square" lIns="108000" tIns="72000" rIns="108000" bIns="72000" numCol="1" spcCol="0" rtlCol="0" fromWordArt="0" anchor="ctr" anchorCtr="0" forceAA="0" compatLnSpc="1">
+            <a:prstTxWarp prst="textNoShape">
+              <a:avLst/>
+            </a:prstTxWarp>
+            <a:noAutofit/>
+          </a:bodyPr>
+          <a:lstStyle/>
+          <a:p>
+            <a:pPr algn="ctr">
+              <a:spcBef>
+                <a:spcPts val="300"/>
+              </a:spcBef>
+              <a:spcAft>
+                <a:spcPts val="300"/>
+              </a:spcAft>
+            </a:pPr>
+            <a:endParaRPr lang="de-DE" sz="1200" b="1" dirty="0" err="1">
+              <a:solidFill>
+                <a:schemeClr val="bg1"/>
+              </a:solidFill>
+            </a:endParaRPr>
+          </a:p>
+        </p:txBody>
+      </p:sp>
+      <p:sp>
+        <p:nvSpPr>
+          <p:cNvPr id="32" name="Rechteck: abgerundete Ecken 31">
+            <a:extLst>
+              <a:ext uri="{FF2B5EF4-FFF2-40B4-BE49-F238E27FC236}">
+                <a16:creationId xmlns:a16="http://schemas.microsoft.com/office/drawing/2014/main" id="{1887783C-A22C-4046-8AF9-313D8E87D6B6}"/>
+              </a:ext>
+            </a:extLst>
+          </p:cNvPr>
+          <p:cNvSpPr/>
+          <p:nvPr/>
+        </p:nvSpPr>
+        <p:spPr bwMode="gray">
+          <a:xfrm>
+            <a:off x="5028458" y="4209687"/>
+            <a:ext cx="720080" cy="455811"/>
+          </a:xfrm>
+          <a:prstGeom prst="roundRect">
+            <a:avLst/>
+          </a:prstGeom>
+          <a:solidFill>
+            <a:schemeClr val="bg1"/>
+          </a:solidFill>
+          <a:ln>
+            <a:solidFill>
+              <a:schemeClr val="accent1"/>
+            </a:solidFill>
+          </a:ln>
+        </p:spPr>
+        <p:style>
+          <a:lnRef idx="2">
+            <a:schemeClr val="accent1">
+              <a:shade val="50000"/>
+            </a:schemeClr>
+          </a:lnRef>
+          <a:fillRef idx="1">
+            <a:schemeClr val="accent1"/>
+          </a:fillRef>
+          <a:effectRef idx="0">
+            <a:schemeClr val="accent1"/>
+          </a:effectRef>
+          <a:fontRef idx="minor">
+            <a:schemeClr val="lt1"/>
+          </a:fontRef>
+        </p:style>
+        <p:txBody>
+          <a:bodyPr rot="0" spcFirstLastPara="0" vertOverflow="overflow" horzOverflow="overflow" vert="horz" wrap="square" lIns="108000" tIns="72000" rIns="108000" bIns="72000" numCol="1" spcCol="0" rtlCol="0" fromWordArt="0" anchor="ctr" anchorCtr="0" forceAA="0" compatLnSpc="1">
+            <a:prstTxWarp prst="textNoShape">
+              <a:avLst/>
+            </a:prstTxWarp>
+            <a:noAutofit/>
+          </a:bodyPr>
+          <a:lstStyle/>
+          <a:p>
+            <a:pPr algn="ctr">
+              <a:spcBef>
+                <a:spcPts val="300"/>
+              </a:spcBef>
+              <a:spcAft>
+                <a:spcPts val="300"/>
+              </a:spcAft>
+            </a:pPr>
+            <a:endParaRPr lang="de-DE" sz="1200" b="1" dirty="0" err="1">
+              <a:solidFill>
+                <a:schemeClr val="bg1"/>
+              </a:solidFill>
+            </a:endParaRPr>
+          </a:p>
+        </p:txBody>
+      </p:sp>
+      <p:sp>
+        <p:nvSpPr>
+          <p:cNvPr id="28" name="Zylinder 27">
+            <a:extLst>
+              <a:ext uri="{FF2B5EF4-FFF2-40B4-BE49-F238E27FC236}">
+                <a16:creationId xmlns:a16="http://schemas.microsoft.com/office/drawing/2014/main" id="{6080095B-618A-4B23-B245-5B21054FC841}"/>
+              </a:ext>
+            </a:extLst>
+          </p:cNvPr>
+          <p:cNvSpPr/>
+          <p:nvPr/>
+        </p:nvSpPr>
+        <p:spPr bwMode="gray">
+          <a:xfrm>
+            <a:off x="3419872" y="3132292"/>
+            <a:ext cx="720066" cy="735596"/>
+          </a:xfrm>
+          <a:prstGeom prst="can">
+            <a:avLst/>
+          </a:prstGeom>
+          <a:solidFill>
+            <a:schemeClr val="accent6">
+              <a:lumMod val="90000"/>
+            </a:schemeClr>
+          </a:solidFill>
+          <a:ln>
+            <a:solidFill>
+              <a:schemeClr val="accent6">
+                <a:lumMod val="75000"/>
+              </a:schemeClr>
+            </a:solidFill>
+          </a:ln>
+          <a:effectLst>
+            <a:outerShdw blurRad="50800" dist="38100" dir="2700000" algn="tl" rotWithShape="0">
+              <a:prstClr val="black">
+                <a:alpha val="40000"/>
+              </a:prstClr>
+            </a:outerShdw>
+          </a:effectLst>
+        </p:spPr>
+        <p:style>
+          <a:lnRef idx="2">
+            <a:schemeClr val="accent1">
+              <a:shade val="50000"/>
+            </a:schemeClr>
+          </a:lnRef>
+          <a:fillRef idx="1">
+            <a:schemeClr val="accent1"/>
+          </a:fillRef>
+          <a:effectRef idx="0">
+            <a:schemeClr val="accent1"/>
+          </a:effectRef>
+          <a:fontRef idx="minor">
+            <a:schemeClr val="lt1"/>
+          </a:fontRef>
+        </p:style>
+        <p:txBody>
+          <a:bodyPr rot="0" spcFirstLastPara="0" vertOverflow="overflow" horzOverflow="overflow" vert="horz" wrap="square" lIns="108000" tIns="72000" rIns="108000" bIns="72000" numCol="1" spcCol="0" rtlCol="0" fromWordArt="0" anchor="ctr" anchorCtr="0" forceAA="0" compatLnSpc="1">
+            <a:prstTxWarp prst="textNoShape">
+              <a:avLst/>
+            </a:prstTxWarp>
+            <a:noAutofit/>
+          </a:bodyPr>
+          <a:lstStyle/>
+          <a:p>
+            <a:pPr algn="ctr">
+              <a:spcBef>
+                <a:spcPts val="300"/>
+              </a:spcBef>
+              <a:spcAft>
+                <a:spcPts val="300"/>
+              </a:spcAft>
+            </a:pPr>
+            <a:endParaRPr lang="de-DE" sz="1200" b="1" dirty="0" err="1">
+              <a:solidFill>
+                <a:schemeClr val="bg1"/>
+              </a:solidFill>
+            </a:endParaRPr>
+          </a:p>
+        </p:txBody>
+      </p:sp>
+      <p:sp>
+        <p:nvSpPr>
+          <p:cNvPr id="34" name="Zylinder 33">
+            <a:extLst>
+              <a:ext uri="{FF2B5EF4-FFF2-40B4-BE49-F238E27FC236}">
+                <a16:creationId xmlns:a16="http://schemas.microsoft.com/office/drawing/2014/main" id="{6F738A51-31E6-4D0A-A0E6-2D9D5D86BF67}"/>
+              </a:ext>
+            </a:extLst>
+          </p:cNvPr>
+          <p:cNvSpPr/>
+          <p:nvPr/>
+        </p:nvSpPr>
+        <p:spPr bwMode="gray">
+          <a:xfrm>
+            <a:off x="6515761" y="3100675"/>
+            <a:ext cx="720066" cy="735596"/>
+          </a:xfrm>
+          <a:prstGeom prst="can">
+            <a:avLst/>
+          </a:prstGeom>
+          <a:solidFill>
+            <a:schemeClr val="accent6">
+              <a:lumMod val="90000"/>
+            </a:schemeClr>
+          </a:solidFill>
+          <a:ln>
+            <a:solidFill>
+              <a:schemeClr val="accent6">
+                <a:lumMod val="75000"/>
+              </a:schemeClr>
+            </a:solidFill>
+          </a:ln>
+          <a:effectLst>
+            <a:outerShdw blurRad="50800" dist="38100" dir="2700000" algn="tl" rotWithShape="0">
+              <a:prstClr val="black">
+                <a:alpha val="40000"/>
+              </a:prstClr>
+            </a:outerShdw>
+          </a:effectLst>
+        </p:spPr>
+        <p:style>
+          <a:lnRef idx="2">
+            <a:schemeClr val="accent1">
+              <a:shade val="50000"/>
+            </a:schemeClr>
+          </a:lnRef>
+          <a:fillRef idx="1">
+            <a:schemeClr val="accent1"/>
+          </a:fillRef>
+          <a:effectRef idx="0">
+            <a:schemeClr val="accent1"/>
+          </a:effectRef>
+          <a:fontRef idx="minor">
+            <a:schemeClr val="lt1"/>
+          </a:fontRef>
+        </p:style>
+        <p:txBody>
+          <a:bodyPr rot="0" spcFirstLastPara="0" vertOverflow="overflow" horzOverflow="overflow" vert="horz" wrap="square" lIns="108000" tIns="72000" rIns="108000" bIns="72000" numCol="1" spcCol="0" rtlCol="0" fromWordArt="0" anchor="ctr" anchorCtr="0" forceAA="0" compatLnSpc="1">
+            <a:prstTxWarp prst="textNoShape">
+              <a:avLst/>
+            </a:prstTxWarp>
+            <a:noAutofit/>
+          </a:bodyPr>
+          <a:lstStyle/>
+          <a:p>
+            <a:pPr algn="ctr">
+              <a:spcBef>
+                <a:spcPts val="300"/>
+              </a:spcBef>
+              <a:spcAft>
+                <a:spcPts val="300"/>
+              </a:spcAft>
+            </a:pPr>
+            <a:endParaRPr lang="de-DE" sz="1200" b="1" dirty="0" err="1">
+              <a:solidFill>
+                <a:schemeClr val="bg1"/>
+              </a:solidFill>
+            </a:endParaRPr>
+          </a:p>
+        </p:txBody>
+      </p:sp>
+      <p:cxnSp>
+        <p:nvCxnSpPr>
+          <p:cNvPr id="35" name="Gerader Verbinder 34">
+            <a:extLst>
+              <a:ext uri="{FF2B5EF4-FFF2-40B4-BE49-F238E27FC236}">
+                <a16:creationId xmlns:a16="http://schemas.microsoft.com/office/drawing/2014/main" id="{E989E752-5CED-4945-8EA6-6CF13FCE67B6}"/>
+              </a:ext>
+            </a:extLst>
+          </p:cNvPr>
+          <p:cNvCxnSpPr>
+            <a:cxnSpLocks/>
+          </p:cNvCxnSpPr>
+          <p:nvPr/>
+        </p:nvCxnSpPr>
+        <p:spPr bwMode="gray">
+          <a:xfrm>
+            <a:off x="1691680" y="1716038"/>
+            <a:ext cx="0" cy="3111806"/>
+          </a:xfrm>
+          <a:prstGeom prst="line">
+            <a:avLst/>
+          </a:prstGeom>
+          <a:ln>
+            <a:prstDash val="lgDash"/>
+          </a:ln>
+        </p:spPr>
+        <p:style>
+          <a:lnRef idx="2">
+            <a:schemeClr val="accent5"/>
+          </a:lnRef>
+          <a:fillRef idx="0">
+            <a:schemeClr val="accent5"/>
+          </a:fillRef>
+          <a:effectRef idx="1">
+            <a:schemeClr val="accent5"/>
+          </a:effectRef>
+          <a:fontRef idx="minor">
+            <a:schemeClr val="tx1"/>
+          </a:fontRef>
+        </p:style>
+      </p:cxnSp>
+      <p:sp>
+        <p:nvSpPr>
+          <p:cNvPr id="36" name="Rechteck: abgerundete Ecken 35">
+            <a:extLst>
+              <a:ext uri="{FF2B5EF4-FFF2-40B4-BE49-F238E27FC236}">
+                <a16:creationId xmlns:a16="http://schemas.microsoft.com/office/drawing/2014/main" id="{87A713EB-B44D-467C-A93B-15C145474277}"/>
+              </a:ext>
+            </a:extLst>
+          </p:cNvPr>
+          <p:cNvSpPr/>
+          <p:nvPr/>
+        </p:nvSpPr>
+        <p:spPr bwMode="gray">
+          <a:xfrm>
+            <a:off x="5028458" y="2244058"/>
+            <a:ext cx="720080" cy="455811"/>
+          </a:xfrm>
+          <a:prstGeom prst="roundRect">
+            <a:avLst/>
+          </a:prstGeom>
+          <a:solidFill>
+            <a:schemeClr val="bg1"/>
+          </a:solidFill>
+          <a:ln>
+            <a:solidFill>
+              <a:schemeClr val="accent3"/>
+            </a:solidFill>
+          </a:ln>
+        </p:spPr>
+        <p:style>
+          <a:lnRef idx="2">
+            <a:schemeClr val="accent1">
+              <a:shade val="50000"/>
+            </a:schemeClr>
+          </a:lnRef>
+          <a:fillRef idx="1">
+            <a:schemeClr val="accent1"/>
+          </a:fillRef>
+          <a:effectRef idx="0">
+            <a:schemeClr val="accent1"/>
+          </a:effectRef>
+          <a:fontRef idx="minor">
+            <a:schemeClr val="lt1"/>
+          </a:fontRef>
+        </p:style>
+        <p:txBody>
+          <a:bodyPr rot="0" spcFirstLastPara="0" vertOverflow="overflow" horzOverflow="overflow" vert="horz" wrap="square" lIns="108000" tIns="72000" rIns="108000" bIns="72000" numCol="1" spcCol="0" rtlCol="0" fromWordArt="0" anchor="ctr" anchorCtr="0" forceAA="0" compatLnSpc="1">
+            <a:prstTxWarp prst="textNoShape">
+              <a:avLst/>
+            </a:prstTxWarp>
+            <a:noAutofit/>
+          </a:bodyPr>
+          <a:lstStyle/>
+          <a:p>
+            <a:pPr algn="ctr">
+              <a:spcBef>
+                <a:spcPts val="300"/>
+              </a:spcBef>
+              <a:spcAft>
+                <a:spcPts val="300"/>
+              </a:spcAft>
+            </a:pPr>
+            <a:endParaRPr lang="de-DE" sz="1200" b="1" dirty="0" err="1">
+              <a:solidFill>
+                <a:schemeClr val="bg1"/>
+              </a:solidFill>
+            </a:endParaRPr>
+          </a:p>
+        </p:txBody>
+      </p:sp>
+      <p:cxnSp>
+        <p:nvCxnSpPr>
+          <p:cNvPr id="30" name="Gerade Verbindung mit Pfeil 29">
+            <a:extLst>
+              <a:ext uri="{FF2B5EF4-FFF2-40B4-BE49-F238E27FC236}">
+                <a16:creationId xmlns:a16="http://schemas.microsoft.com/office/drawing/2014/main" id="{9B1778E5-345D-48EB-9EF7-44E0E96F506E}"/>
+              </a:ext>
+            </a:extLst>
+          </p:cNvPr>
+          <p:cNvCxnSpPr>
+            <a:cxnSpLocks/>
+          </p:cNvCxnSpPr>
+          <p:nvPr/>
+        </p:nvCxnSpPr>
+        <p:spPr bwMode="gray">
+          <a:xfrm>
+            <a:off x="1438463" y="2484742"/>
+            <a:ext cx="1909401" cy="671827"/>
+          </a:xfrm>
+          <a:prstGeom prst="straightConnector1">
+            <a:avLst/>
+          </a:prstGeom>
+          <a:ln>
+            <a:tailEnd type="triangle"/>
+          </a:ln>
+        </p:spPr>
+        <p:style>
+          <a:lnRef idx="2">
+            <a:schemeClr val="accent3"/>
+          </a:lnRef>
+          <a:fillRef idx="0">
+            <a:schemeClr val="accent3"/>
+          </a:fillRef>
+          <a:effectRef idx="1">
+            <a:schemeClr val="accent3"/>
+          </a:effectRef>
+          <a:fontRef idx="minor">
+            <a:schemeClr val="tx1"/>
+          </a:fontRef>
+        </p:style>
+      </p:cxnSp>
+      <p:cxnSp>
+        <p:nvCxnSpPr>
+          <p:cNvPr id="42" name="Gerade Verbindung mit Pfeil 41">
+            <a:extLst>
+              <a:ext uri="{FF2B5EF4-FFF2-40B4-BE49-F238E27FC236}">
+                <a16:creationId xmlns:a16="http://schemas.microsoft.com/office/drawing/2014/main" id="{F10692B5-9990-40A4-826C-1A69E0048210}"/>
+              </a:ext>
+            </a:extLst>
+          </p:cNvPr>
+          <p:cNvCxnSpPr>
+            <a:cxnSpLocks/>
+          </p:cNvCxnSpPr>
+          <p:nvPr/>
+        </p:nvCxnSpPr>
+        <p:spPr bwMode="gray">
+          <a:xfrm>
+            <a:off x="1438463" y="3468473"/>
+            <a:ext cx="541249" cy="0"/>
+          </a:xfrm>
+          <a:prstGeom prst="straightConnector1">
+            <a:avLst/>
+          </a:prstGeom>
+          <a:ln>
+            <a:solidFill>
+              <a:schemeClr val="accent4"/>
+            </a:solidFill>
+            <a:tailEnd type="triangle"/>
+          </a:ln>
+        </p:spPr>
+        <p:style>
+          <a:lnRef idx="2">
+            <a:schemeClr val="accent3"/>
+          </a:lnRef>
+          <a:fillRef idx="0">
+            <a:schemeClr val="accent3"/>
+          </a:fillRef>
+          <a:effectRef idx="1">
+            <a:schemeClr val="accent3"/>
+          </a:effectRef>
+          <a:fontRef idx="minor">
+            <a:schemeClr val="tx1"/>
+          </a:fontRef>
+        </p:style>
+      </p:cxnSp>
+      <p:cxnSp>
+        <p:nvCxnSpPr>
+          <p:cNvPr id="46" name="Gerade Verbindung mit Pfeil 45">
+            <a:extLst>
+              <a:ext uri="{FF2B5EF4-FFF2-40B4-BE49-F238E27FC236}">
+                <a16:creationId xmlns:a16="http://schemas.microsoft.com/office/drawing/2014/main" id="{2F71282C-4225-4BFC-A0E7-B2CF41880D43}"/>
+              </a:ext>
+            </a:extLst>
+          </p:cNvPr>
+          <p:cNvCxnSpPr>
+            <a:cxnSpLocks/>
+          </p:cNvCxnSpPr>
+          <p:nvPr/>
+        </p:nvCxnSpPr>
+        <p:spPr bwMode="gray">
+          <a:xfrm>
+            <a:off x="2915816" y="3452045"/>
+            <a:ext cx="432048" cy="0"/>
+          </a:xfrm>
+          <a:prstGeom prst="straightConnector1">
+            <a:avLst/>
+          </a:prstGeom>
+          <a:ln>
+            <a:solidFill>
+              <a:schemeClr val="accent4"/>
+            </a:solidFill>
+            <a:tailEnd type="triangle"/>
+          </a:ln>
+        </p:spPr>
+        <p:style>
+          <a:lnRef idx="2">
+            <a:schemeClr val="accent3"/>
+          </a:lnRef>
+          <a:fillRef idx="0">
+            <a:schemeClr val="accent3"/>
+          </a:fillRef>
+          <a:effectRef idx="1">
+            <a:schemeClr val="accent3"/>
+          </a:effectRef>
+          <a:fontRef idx="minor">
+            <a:schemeClr val="tx1"/>
+          </a:fontRef>
+        </p:style>
+      </p:cxnSp>
+      <p:cxnSp>
+        <p:nvCxnSpPr>
+          <p:cNvPr id="48" name="Gerade Verbindung mit Pfeil 47">
+            <a:extLst>
+              <a:ext uri="{FF2B5EF4-FFF2-40B4-BE49-F238E27FC236}">
+                <a16:creationId xmlns:a16="http://schemas.microsoft.com/office/drawing/2014/main" id="{42556BDA-3408-4C2B-BF60-14E04EE540F7}"/>
+              </a:ext>
+            </a:extLst>
+          </p:cNvPr>
+          <p:cNvCxnSpPr>
+            <a:cxnSpLocks/>
+          </p:cNvCxnSpPr>
+          <p:nvPr/>
+        </p:nvCxnSpPr>
+        <p:spPr bwMode="gray">
+          <a:xfrm>
+            <a:off x="1421055" y="4437592"/>
+            <a:ext cx="541249" cy="0"/>
+          </a:xfrm>
+          <a:prstGeom prst="straightConnector1">
+            <a:avLst/>
+          </a:prstGeom>
+          <a:ln>
+            <a:solidFill>
+              <a:schemeClr val="accent1"/>
+            </a:solidFill>
+            <a:tailEnd type="triangle"/>
+          </a:ln>
+        </p:spPr>
+        <p:style>
+          <a:lnRef idx="2">
+            <a:schemeClr val="accent3"/>
+          </a:lnRef>
+          <a:fillRef idx="0">
+            <a:schemeClr val="accent3"/>
+          </a:fillRef>
+          <a:effectRef idx="1">
+            <a:schemeClr val="accent3"/>
+          </a:effectRef>
+          <a:fontRef idx="minor">
+            <a:schemeClr val="tx1"/>
+          </a:fontRef>
+        </p:style>
+      </p:cxnSp>
+      <p:cxnSp>
+        <p:nvCxnSpPr>
+          <p:cNvPr id="49" name="Gerade Verbindung mit Pfeil 48">
+            <a:extLst>
+              <a:ext uri="{FF2B5EF4-FFF2-40B4-BE49-F238E27FC236}">
+                <a16:creationId xmlns:a16="http://schemas.microsoft.com/office/drawing/2014/main" id="{87CF3F2D-FA57-4716-8BDF-D301AE97EDEF}"/>
+              </a:ext>
+            </a:extLst>
+          </p:cNvPr>
+          <p:cNvCxnSpPr>
+            <a:cxnSpLocks/>
+          </p:cNvCxnSpPr>
+          <p:nvPr/>
+        </p:nvCxnSpPr>
+        <p:spPr bwMode="gray">
+          <a:xfrm flipV="1">
+            <a:off x="2915816" y="3867888"/>
+            <a:ext cx="432048" cy="614832"/>
+          </a:xfrm>
+          <a:prstGeom prst="straightConnector1">
+            <a:avLst/>
+          </a:prstGeom>
+          <a:ln>
+            <a:solidFill>
+              <a:schemeClr val="accent1"/>
+            </a:solidFill>
+            <a:tailEnd type="triangle"/>
+          </a:ln>
+        </p:spPr>
+        <p:style>
+          <a:lnRef idx="2">
+            <a:schemeClr val="accent3"/>
+          </a:lnRef>
+          <a:fillRef idx="0">
+            <a:schemeClr val="accent3"/>
+          </a:fillRef>
+          <a:effectRef idx="1">
+            <a:schemeClr val="accent3"/>
+          </a:effectRef>
+          <a:fontRef idx="minor">
+            <a:schemeClr val="tx1"/>
+          </a:fontRef>
+        </p:style>
+      </p:cxnSp>
+      <p:cxnSp>
+        <p:nvCxnSpPr>
+          <p:cNvPr id="51" name="Gerade Verbindung mit Pfeil 50">
+            <a:extLst>
+              <a:ext uri="{FF2B5EF4-FFF2-40B4-BE49-F238E27FC236}">
+                <a16:creationId xmlns:a16="http://schemas.microsoft.com/office/drawing/2014/main" id="{E329F416-60DD-432B-BEC5-06C51BA042A5}"/>
+              </a:ext>
+            </a:extLst>
+          </p:cNvPr>
+          <p:cNvCxnSpPr>
+            <a:cxnSpLocks/>
+          </p:cNvCxnSpPr>
+          <p:nvPr/>
+        </p:nvCxnSpPr>
+        <p:spPr bwMode="gray">
+          <a:xfrm flipV="1">
+            <a:off x="4283968" y="2531510"/>
+            <a:ext cx="627379" cy="692630"/>
+          </a:xfrm>
+          <a:prstGeom prst="straightConnector1">
+            <a:avLst/>
+          </a:prstGeom>
+          <a:ln>
+            <a:tailEnd type="triangle"/>
+          </a:ln>
+        </p:spPr>
+        <p:style>
+          <a:lnRef idx="2">
+            <a:schemeClr val="accent3"/>
+          </a:lnRef>
+          <a:fillRef idx="0">
+            <a:schemeClr val="accent3"/>
+          </a:fillRef>
+          <a:effectRef idx="1">
+            <a:schemeClr val="accent3"/>
+          </a:effectRef>
+          <a:fontRef idx="minor">
+            <a:schemeClr val="tx1"/>
+          </a:fontRef>
+        </p:style>
+      </p:cxnSp>
+      <p:cxnSp>
+        <p:nvCxnSpPr>
+          <p:cNvPr id="54" name="Gerade Verbindung mit Pfeil 53">
+            <a:extLst>
+              <a:ext uri="{FF2B5EF4-FFF2-40B4-BE49-F238E27FC236}">
+                <a16:creationId xmlns:a16="http://schemas.microsoft.com/office/drawing/2014/main" id="{040B9733-0647-44AC-ACF8-6BD047545F14}"/>
+              </a:ext>
+            </a:extLst>
+          </p:cNvPr>
+          <p:cNvCxnSpPr>
+            <a:cxnSpLocks/>
+          </p:cNvCxnSpPr>
+          <p:nvPr/>
+        </p:nvCxnSpPr>
+        <p:spPr bwMode="gray">
+          <a:xfrm>
+            <a:off x="4283968" y="3468473"/>
+            <a:ext cx="627379" cy="0"/>
+          </a:xfrm>
+          <a:prstGeom prst="straightConnector1">
+            <a:avLst/>
+          </a:prstGeom>
+          <a:ln>
+            <a:solidFill>
+              <a:schemeClr val="accent4"/>
+            </a:solidFill>
+            <a:tailEnd type="triangle"/>
+          </a:ln>
+        </p:spPr>
+        <p:style>
+          <a:lnRef idx="2">
+            <a:schemeClr val="accent3"/>
+          </a:lnRef>
+          <a:fillRef idx="0">
+            <a:schemeClr val="accent3"/>
+          </a:fillRef>
+          <a:effectRef idx="1">
+            <a:schemeClr val="accent3"/>
+          </a:effectRef>
+          <a:fontRef idx="minor">
+            <a:schemeClr val="tx1"/>
+          </a:fontRef>
+        </p:style>
+      </p:cxnSp>
+      <p:cxnSp>
+        <p:nvCxnSpPr>
+          <p:cNvPr id="56" name="Gerade Verbindung mit Pfeil 55">
+            <a:extLst>
+              <a:ext uri="{FF2B5EF4-FFF2-40B4-BE49-F238E27FC236}">
+                <a16:creationId xmlns:a16="http://schemas.microsoft.com/office/drawing/2014/main" id="{81100FFC-D572-42C7-8BB4-25BD890157D5}"/>
+              </a:ext>
+            </a:extLst>
+          </p:cNvPr>
+          <p:cNvCxnSpPr>
+            <a:cxnSpLocks/>
+          </p:cNvCxnSpPr>
+          <p:nvPr/>
+        </p:nvCxnSpPr>
+        <p:spPr bwMode="gray">
+          <a:xfrm>
+            <a:off x="4283968" y="3904589"/>
+            <a:ext cx="601695" cy="484973"/>
+          </a:xfrm>
+          <a:prstGeom prst="straightConnector1">
+            <a:avLst/>
+          </a:prstGeom>
+          <a:ln>
+            <a:solidFill>
+              <a:schemeClr val="accent1"/>
+            </a:solidFill>
+            <a:tailEnd type="triangle"/>
+          </a:ln>
+        </p:spPr>
+        <p:style>
+          <a:lnRef idx="2">
+            <a:schemeClr val="accent3"/>
+          </a:lnRef>
+          <a:fillRef idx="0">
+            <a:schemeClr val="accent3"/>
+          </a:fillRef>
+          <a:effectRef idx="1">
+            <a:schemeClr val="accent3"/>
+          </a:effectRef>
+          <a:fontRef idx="minor">
+            <a:schemeClr val="tx1"/>
+          </a:fontRef>
+        </p:style>
+      </p:cxnSp>
+      <p:cxnSp>
+        <p:nvCxnSpPr>
+          <p:cNvPr id="59" name="Gerade Verbindung mit Pfeil 58">
+            <a:extLst>
+              <a:ext uri="{FF2B5EF4-FFF2-40B4-BE49-F238E27FC236}">
+                <a16:creationId xmlns:a16="http://schemas.microsoft.com/office/drawing/2014/main" id="{4A003C08-1A08-41D6-8D9C-D5C4C0AA0741}"/>
+              </a:ext>
+            </a:extLst>
+          </p:cNvPr>
+          <p:cNvCxnSpPr>
+            <a:cxnSpLocks/>
+          </p:cNvCxnSpPr>
+          <p:nvPr/>
+        </p:nvCxnSpPr>
+        <p:spPr bwMode="gray">
+          <a:xfrm>
+            <a:off x="5868129" y="2571750"/>
+            <a:ext cx="466658" cy="608312"/>
+          </a:xfrm>
+          <a:prstGeom prst="straightConnector1">
+            <a:avLst/>
+          </a:prstGeom>
+          <a:ln>
+            <a:tailEnd type="triangle"/>
+          </a:ln>
+        </p:spPr>
+        <p:style>
+          <a:lnRef idx="2">
+            <a:schemeClr val="accent3"/>
+          </a:lnRef>
+          <a:fillRef idx="0">
+            <a:schemeClr val="accent3"/>
+          </a:fillRef>
+          <a:effectRef idx="1">
+            <a:schemeClr val="accent3"/>
+          </a:effectRef>
+          <a:fontRef idx="minor">
+            <a:schemeClr val="tx1"/>
+          </a:fontRef>
+        </p:style>
+      </p:cxnSp>
+      <p:cxnSp>
+        <p:nvCxnSpPr>
+          <p:cNvPr id="62" name="Gerade Verbindung mit Pfeil 61">
+            <a:extLst>
+              <a:ext uri="{FF2B5EF4-FFF2-40B4-BE49-F238E27FC236}">
+                <a16:creationId xmlns:a16="http://schemas.microsoft.com/office/drawing/2014/main" id="{DE7B3312-9E19-4B24-9813-05DB6256DA07}"/>
+              </a:ext>
+            </a:extLst>
+          </p:cNvPr>
+          <p:cNvCxnSpPr>
+            <a:cxnSpLocks/>
+          </p:cNvCxnSpPr>
+          <p:nvPr/>
+        </p:nvCxnSpPr>
+        <p:spPr bwMode="gray">
+          <a:xfrm>
+            <a:off x="5868129" y="3468473"/>
+            <a:ext cx="466658" cy="0"/>
+          </a:xfrm>
+          <a:prstGeom prst="straightConnector1">
+            <a:avLst/>
+          </a:prstGeom>
+          <a:ln>
+            <a:solidFill>
+              <a:schemeClr val="accent4"/>
+            </a:solidFill>
+            <a:tailEnd type="triangle"/>
+          </a:ln>
+        </p:spPr>
+        <p:style>
+          <a:lnRef idx="2">
+            <a:schemeClr val="accent3"/>
+          </a:lnRef>
+          <a:fillRef idx="0">
+            <a:schemeClr val="accent3"/>
+          </a:fillRef>
+          <a:effectRef idx="1">
+            <a:schemeClr val="accent3"/>
+          </a:effectRef>
+          <a:fontRef idx="minor">
+            <a:schemeClr val="tx1"/>
+          </a:fontRef>
+        </p:style>
+      </p:cxnSp>
+      <p:cxnSp>
+        <p:nvCxnSpPr>
+          <p:cNvPr id="67" name="Gerade Verbindung mit Pfeil 66">
+            <a:extLst>
+              <a:ext uri="{FF2B5EF4-FFF2-40B4-BE49-F238E27FC236}">
+                <a16:creationId xmlns:a16="http://schemas.microsoft.com/office/drawing/2014/main" id="{89583537-751C-4376-916C-3883B97E612A}"/>
+              </a:ext>
+            </a:extLst>
+          </p:cNvPr>
+          <p:cNvCxnSpPr>
+            <a:cxnSpLocks/>
+          </p:cNvCxnSpPr>
+          <p:nvPr/>
+        </p:nvCxnSpPr>
+        <p:spPr bwMode="gray">
+          <a:xfrm flipV="1">
+            <a:off x="5868129" y="3823185"/>
+            <a:ext cx="504071" cy="614408"/>
+          </a:xfrm>
+          <a:prstGeom prst="straightConnector1">
+            <a:avLst/>
+          </a:prstGeom>
+          <a:ln>
+            <a:solidFill>
+              <a:schemeClr val="accent1"/>
+            </a:solidFill>
+            <a:tailEnd type="triangle"/>
+          </a:ln>
+        </p:spPr>
+        <p:style>
+          <a:lnRef idx="2">
+            <a:schemeClr val="accent3"/>
+          </a:lnRef>
+          <a:fillRef idx="0">
+            <a:schemeClr val="accent3"/>
+          </a:fillRef>
+          <a:effectRef idx="1">
+            <a:schemeClr val="accent3"/>
+          </a:effectRef>
+          <a:fontRef idx="minor">
+            <a:schemeClr val="tx1"/>
+          </a:fontRef>
+        </p:style>
+      </p:cxnSp>
+      <p:sp>
+        <p:nvSpPr>
+          <p:cNvPr id="71" name="Textfeld 70">
+            <a:extLst>
+              <a:ext uri="{FF2B5EF4-FFF2-40B4-BE49-F238E27FC236}">
+                <a16:creationId xmlns:a16="http://schemas.microsoft.com/office/drawing/2014/main" id="{8A076924-C8C5-46FA-A330-48B3164E01AE}"/>
+              </a:ext>
+            </a:extLst>
+          </p:cNvPr>
+          <p:cNvSpPr txBox="1"/>
+          <p:nvPr/>
+        </p:nvSpPr>
+        <p:spPr bwMode="gray">
+          <a:xfrm>
+            <a:off x="647168" y="2875906"/>
+            <a:ext cx="576064" cy="360040"/>
+          </a:xfrm>
+          <a:prstGeom prst="rect">
+            <a:avLst/>
+          </a:prstGeom>
+          <a:noFill/>
+        </p:spPr>
+        <p:txBody>
+          <a:bodyPr wrap="square" lIns="0" tIns="0" rIns="0" bIns="0" rtlCol="0">
+            <a:noAutofit/>
+          </a:bodyPr>
+          <a:lstStyle/>
+          <a:p>
+            <a:pPr>
+              <a:spcBef>
+                <a:spcPts val="300"/>
+              </a:spcBef>
+              <a:spcAft>
+                <a:spcPts val="300"/>
+              </a:spcAft>
+              <a:buClr>
+                <a:schemeClr val="accent1"/>
+              </a:buClr>
+              <a:buSzPct val="90000"/>
+            </a:pPr>
+            <a:r>
+              <a:rPr lang="de-DE" sz="1200" b="1" dirty="0">
+                <a:solidFill>
+                  <a:schemeClr val="accent4"/>
+                </a:solidFill>
+              </a:rPr>
+              <a:t>WDI</a:t>
+            </a:r>
+          </a:p>
+        </p:txBody>
+      </p:sp>
+      <p:sp>
+        <p:nvSpPr>
+          <p:cNvPr id="72" name="Textfeld 71">
+            <a:extLst>
+              <a:ext uri="{FF2B5EF4-FFF2-40B4-BE49-F238E27FC236}">
+                <a16:creationId xmlns:a16="http://schemas.microsoft.com/office/drawing/2014/main" id="{A0217CCB-3ADA-42CC-84E0-799D00D11FA6}"/>
+              </a:ext>
+            </a:extLst>
+          </p:cNvPr>
+          <p:cNvSpPr txBox="1"/>
+          <p:nvPr/>
+        </p:nvSpPr>
+        <p:spPr bwMode="gray">
+          <a:xfrm>
+            <a:off x="610767" y="1932466"/>
+            <a:ext cx="576064" cy="360040"/>
+          </a:xfrm>
+          <a:prstGeom prst="rect">
+            <a:avLst/>
+          </a:prstGeom>
+          <a:noFill/>
+        </p:spPr>
+        <p:txBody>
+          <a:bodyPr wrap="square" lIns="0" tIns="0" rIns="0" bIns="0" rtlCol="0">
+            <a:noAutofit/>
+          </a:bodyPr>
+          <a:lstStyle/>
+          <a:p>
+            <a:pPr>
+              <a:spcBef>
+                <a:spcPts val="300"/>
+              </a:spcBef>
+              <a:spcAft>
+                <a:spcPts val="300"/>
+              </a:spcAft>
+              <a:buClr>
+                <a:schemeClr val="accent1"/>
+              </a:buClr>
+              <a:buSzPct val="90000"/>
+            </a:pPr>
+            <a:r>
+              <a:rPr lang="de-DE" sz="1200" b="1" dirty="0" err="1">
+                <a:solidFill>
+                  <a:schemeClr val="accent3"/>
+                </a:solidFill>
+              </a:rPr>
+              <a:t>GHDx</a:t>
+            </a:r>
+            <a:endParaRPr lang="de-DE" sz="1200" b="1" dirty="0">
+              <a:solidFill>
+                <a:schemeClr val="accent3"/>
+              </a:solidFill>
+            </a:endParaRPr>
+          </a:p>
+        </p:txBody>
+      </p:sp>
+      <p:sp>
+        <p:nvSpPr>
+          <p:cNvPr id="73" name="Textfeld 72">
+            <a:extLst>
+              <a:ext uri="{FF2B5EF4-FFF2-40B4-BE49-F238E27FC236}">
+                <a16:creationId xmlns:a16="http://schemas.microsoft.com/office/drawing/2014/main" id="{CB23A694-3505-4BBE-9F3B-A9259D87D927}"/>
+              </a:ext>
+            </a:extLst>
+          </p:cNvPr>
+          <p:cNvSpPr txBox="1"/>
+          <p:nvPr/>
+        </p:nvSpPr>
+        <p:spPr bwMode="gray">
+          <a:xfrm>
+            <a:off x="627762" y="3854425"/>
+            <a:ext cx="576064" cy="360040"/>
+          </a:xfrm>
+          <a:prstGeom prst="rect">
+            <a:avLst/>
+          </a:prstGeom>
+          <a:noFill/>
+        </p:spPr>
+        <p:txBody>
+          <a:bodyPr wrap="square" lIns="0" tIns="0" rIns="0" bIns="0" rtlCol="0">
+            <a:noAutofit/>
+          </a:bodyPr>
+          <a:lstStyle/>
+          <a:p>
+            <a:pPr>
+              <a:spcBef>
+                <a:spcPts val="300"/>
+              </a:spcBef>
+              <a:spcAft>
+                <a:spcPts val="300"/>
+              </a:spcAft>
+              <a:buClr>
+                <a:schemeClr val="accent1"/>
+              </a:buClr>
+              <a:buSzPct val="90000"/>
+            </a:pPr>
+            <a:r>
+              <a:rPr lang="de-DE" sz="1200" b="1" dirty="0">
+                <a:solidFill>
+                  <a:schemeClr val="accent1"/>
+                </a:solidFill>
+              </a:rPr>
+              <a:t>IHME</a:t>
+            </a:r>
           </a:p>
         </p:txBody>
       </p:sp>
@@ -13015,10 +16615,7 @@
           <a:bodyPr/>
           <a:lstStyle/>
           <a:p>
-            <a:r>
-              <a:rPr lang="de-DE" dirty="0"/>
-              <a:t>Vorher: 61 Tabellen, 1741 MB</a:t>
-            </a:r>
+            <a:endParaRPr lang="de-DE" dirty="0"/>
           </a:p>
         </p:txBody>
       </p:sp>
@@ -13123,10 +16720,100 @@
           </a:p>
         </p:txBody>
       </p:sp>
+      <p:pic>
+        <p:nvPicPr>
+          <p:cNvPr id="2" name="Grafik 1">
+            <a:extLst>
+              <a:ext uri="{FF2B5EF4-FFF2-40B4-BE49-F238E27FC236}">
+                <a16:creationId xmlns:a16="http://schemas.microsoft.com/office/drawing/2014/main" id="{1BC7CA98-1389-4846-8922-B5F2992DBCA2}"/>
+              </a:ext>
+            </a:extLst>
+          </p:cNvPr>
+          <p:cNvPicPr>
+            <a:picLocks noChangeAspect="1"/>
+          </p:cNvPicPr>
+          <p:nvPr/>
+        </p:nvPicPr>
+        <p:blipFill>
+          <a:blip r:embed="rId2"/>
+          <a:stretch>
+            <a:fillRect/>
+          </a:stretch>
+        </p:blipFill>
+        <p:spPr>
+          <a:xfrm>
+            <a:off x="539552" y="1779662"/>
+            <a:ext cx="5436096" cy="2204384"/>
+          </a:xfrm>
+          <a:prstGeom prst="rect">
+            <a:avLst/>
+          </a:prstGeom>
+        </p:spPr>
+      </p:pic>
+      <p:pic>
+        <p:nvPicPr>
+          <p:cNvPr id="9" name="Grafik 8">
+            <a:extLst>
+              <a:ext uri="{FF2B5EF4-FFF2-40B4-BE49-F238E27FC236}">
+                <a16:creationId xmlns:a16="http://schemas.microsoft.com/office/drawing/2014/main" id="{353B87F2-53DD-4C40-AFA9-1B9CA8426EBA}"/>
+              </a:ext>
+            </a:extLst>
+          </p:cNvPr>
+          <p:cNvPicPr>
+            <a:picLocks noChangeAspect="1"/>
+          </p:cNvPicPr>
+          <p:nvPr/>
+        </p:nvPicPr>
+        <p:blipFill>
+          <a:blip r:embed="rId3"/>
+          <a:stretch>
+            <a:fillRect/>
+          </a:stretch>
+        </p:blipFill>
+        <p:spPr>
+          <a:xfrm>
+            <a:off x="3923928" y="2266289"/>
+            <a:ext cx="3094856" cy="460815"/>
+          </a:xfrm>
+          <a:prstGeom prst="rect">
+            <a:avLst/>
+          </a:prstGeom>
+        </p:spPr>
+      </p:pic>
+      <p:pic>
+        <p:nvPicPr>
+          <p:cNvPr id="10" name="Grafik 9">
+            <a:extLst>
+              <a:ext uri="{FF2B5EF4-FFF2-40B4-BE49-F238E27FC236}">
+                <a16:creationId xmlns:a16="http://schemas.microsoft.com/office/drawing/2014/main" id="{389AB167-02CA-4708-B78F-03F536868228}"/>
+              </a:ext>
+            </a:extLst>
+          </p:cNvPr>
+          <p:cNvPicPr>
+            <a:picLocks noChangeAspect="1"/>
+          </p:cNvPicPr>
+          <p:nvPr/>
+        </p:nvPicPr>
+        <p:blipFill>
+          <a:blip r:embed="rId4"/>
+          <a:stretch>
+            <a:fillRect/>
+          </a:stretch>
+        </p:blipFill>
+        <p:spPr>
+          <a:xfrm>
+            <a:off x="2495825" y="3184252"/>
+            <a:ext cx="4740002" cy="1633560"/>
+          </a:xfrm>
+          <a:prstGeom prst="rect">
+            <a:avLst/>
+          </a:prstGeom>
+        </p:spPr>
+      </p:pic>
     </p:spTree>
     <p:extLst>
       <p:ext uri="{BB962C8B-B14F-4D97-AF65-F5344CB8AC3E}">
-        <p14:creationId xmlns:p14="http://schemas.microsoft.com/office/powerpoint/2010/main" val="3110667540"/>
+        <p14:creationId xmlns:p14="http://schemas.microsoft.com/office/powerpoint/2010/main" val="2461955234"/>
       </p:ext>
     </p:extLst>
   </p:cSld>
@@ -13158,7 +16845,26 @@
       </p:grpSpPr>
       <p:sp>
         <p:nvSpPr>
-          <p:cNvPr id="6157" name="Title 6156"/>
+          <p:cNvPr id="8" name="Textplatzhalter 7"/>
+          <p:cNvSpPr>
+            <a:spLocks noGrp="1"/>
+          </p:cNvSpPr>
+          <p:nvPr>
+            <p:ph type="body" sz="quarter" idx="13"/>
+          </p:nvPr>
+        </p:nvSpPr>
+        <p:spPr/>
+        <p:txBody>
+          <a:bodyPr/>
+          <a:lstStyle/>
+          <a:p>
+            <a:endParaRPr lang="de-DE" dirty="0"/>
+          </a:p>
+        </p:txBody>
+      </p:sp>
+      <p:sp>
+        <p:nvSpPr>
+          <p:cNvPr id="7" name="Titel 6"/>
           <p:cNvSpPr>
             <a:spLocks noGrp="1"/>
           </p:cNvSpPr>
@@ -13177,28 +16883,30 @@
           <a:lstStyle/>
           <a:p>
             <a:r>
-              <a:rPr lang="en-US" dirty="0"/>
-              <a:t>Was </a:t>
-            </a:r>
-            <a:r>
-              <a:rPr lang="en-US" dirty="0" err="1"/>
-              <a:t>wir</a:t>
-            </a:r>
-            <a:r>
-              <a:rPr lang="en-US" dirty="0"/>
-              <a:t> </a:t>
-            </a:r>
-            <a:r>
-              <a:rPr lang="en-US" dirty="0" err="1"/>
-              <a:t>gelernt</a:t>
-            </a:r>
-            <a:r>
-              <a:rPr lang="en-US" dirty="0"/>
-              <a:t> </a:t>
-            </a:r>
-            <a:r>
-              <a:rPr lang="en-US" dirty="0" err="1"/>
-              <a:t>haben</a:t>
+              <a:rPr lang="de-DE" dirty="0"/>
+              <a:t>Beispiele und Statistiken</a:t>
+            </a:r>
+          </a:p>
+        </p:txBody>
+      </p:sp>
+      <p:sp>
+        <p:nvSpPr>
+          <p:cNvPr id="4" name="Datumsplatzhalter 3"/>
+          <p:cNvSpPr>
+            <a:spLocks noGrp="1"/>
+          </p:cNvSpPr>
+          <p:nvPr>
+            <p:ph type="dt" sz="half" idx="14"/>
+          </p:nvPr>
+        </p:nvSpPr>
+        <p:spPr/>
+        <p:txBody>
+          <a:bodyPr/>
+          <a:lstStyle/>
+          <a:p>
+            <a:r>
+              <a:rPr lang="en-US"/>
+              <a:t>Speaker, Job Description, Date if needed</a:t>
             </a:r>
             <a:endParaRPr lang="en-US" dirty="0"/>
           </a:p>
@@ -13206,86 +16914,30 @@
       </p:sp>
       <p:sp>
         <p:nvSpPr>
-          <p:cNvPr id="6158" name="Text Placeholder 6157"/>
+          <p:cNvPr id="5" name="Fußzeilenplatzhalter 4"/>
           <p:cNvSpPr>
             <a:spLocks noGrp="1"/>
           </p:cNvSpPr>
           <p:nvPr>
-            <p:ph type="body" sz="quarter" idx="13"/>
+            <p:ph type="ftr" sz="quarter" idx="15"/>
           </p:nvPr>
         </p:nvSpPr>
         <p:spPr/>
         <p:txBody>
-          <a:bodyPr>
-            <a:normAutofit/>
-          </a:bodyPr>
-          <a:lstStyle/>
-          <a:p>
-            <a:r>
-              <a:rPr lang="en-US" dirty="0"/>
-              <a:t>% in Postgres -&gt; </a:t>
-            </a:r>
-            <a:r>
-              <a:rPr lang="en-US" dirty="0" err="1"/>
-              <a:t>sqlalchemy</a:t>
-            </a:r>
-            <a:r>
-              <a:rPr lang="en-US" dirty="0"/>
-              <a:t> </a:t>
-            </a:r>
-            <a:r>
-              <a:rPr lang="en-US" dirty="0" err="1"/>
-              <a:t>interpretiert</a:t>
-            </a:r>
-            <a:r>
-              <a:rPr lang="en-US" dirty="0"/>
-              <a:t> % </a:t>
-            </a:r>
-            <a:r>
-              <a:rPr lang="en-US" dirty="0" err="1"/>
-              <a:t>als</a:t>
-            </a:r>
-            <a:r>
-              <a:rPr lang="en-US" dirty="0"/>
-              <a:t> </a:t>
-            </a:r>
-            <a:r>
-              <a:rPr lang="en-US" dirty="0" err="1"/>
-              <a:t>Platzhalter</a:t>
-            </a:r>
-            <a:r>
-              <a:rPr lang="en-US" dirty="0"/>
-              <a:t> -&gt; Wrapper </a:t>
-            </a:r>
-            <a:r>
-              <a:rPr lang="en-US" dirty="0" err="1"/>
-              <a:t>benötigt</a:t>
+          <a:bodyPr/>
+          <a:lstStyle/>
+          <a:p>
+            <a:r>
+              <a:rPr lang="en-US"/>
+              <a:t>Presentation Title</a:t>
             </a:r>
             <a:endParaRPr lang="en-US" dirty="0"/>
           </a:p>
-          <a:p>
-            <a:r>
-              <a:rPr lang="en-US" dirty="0" err="1"/>
-              <a:t>Falsche</a:t>
-            </a:r>
-            <a:r>
-              <a:rPr lang="en-US" dirty="0"/>
-              <a:t> </a:t>
-            </a:r>
-            <a:r>
-              <a:rPr lang="en-US" dirty="0" err="1"/>
-              <a:t>Annahmen</a:t>
-            </a:r>
-            <a:r>
-              <a:rPr lang="en-US" dirty="0"/>
-              <a:t>: </a:t>
-            </a:r>
-          </a:p>
-        </p:txBody>
-      </p:sp>
-      <p:sp>
-        <p:nvSpPr>
-          <p:cNvPr id="6163" name="Slide Number Placeholder 6162"/>
+        </p:txBody>
+      </p:sp>
+      <p:sp>
+        <p:nvSpPr>
+          <p:cNvPr id="6" name="Foliennummernplatzhalter 5"/>
           <p:cNvSpPr>
             <a:spLocks noGrp="1"/>
           </p:cNvSpPr>
@@ -13293,12 +16945,7 @@
             <p:ph type="sldNum" sz="quarter" idx="16"/>
           </p:nvPr>
         </p:nvSpPr>
-        <p:spPr>
-          <a:xfrm>
-            <a:off x="7416801" y="4623195"/>
-            <a:ext cx="1547813" cy="180580"/>
-          </a:xfrm>
-        </p:spPr>
+        <p:spPr/>
         <p:txBody>
           <a:bodyPr/>
           <a:lstStyle/>
@@ -13316,66 +16963,12 @@
           </a:p>
         </p:txBody>
       </p:sp>
-      <p:sp>
-        <p:nvSpPr>
-          <p:cNvPr id="2" name="Date Placeholder 1"/>
-          <p:cNvSpPr>
-            <a:spLocks noGrp="1"/>
-          </p:cNvSpPr>
-          <p:nvPr>
-            <p:ph type="dt" sz="half" idx="14"/>
-          </p:nvPr>
-        </p:nvSpPr>
-        <p:spPr>
-          <a:xfrm>
-            <a:off x="7416801" y="4155928"/>
-            <a:ext cx="1547813" cy="467268"/>
-          </a:xfrm>
-        </p:spPr>
-        <p:txBody>
-          <a:bodyPr/>
-          <a:lstStyle/>
-          <a:p>
-            <a:r>
-              <a:rPr lang="en-US" dirty="0"/>
-              <a:t>Speaker, Job Description, Date if needed</a:t>
-            </a:r>
-          </a:p>
-        </p:txBody>
-      </p:sp>
-      <p:sp>
-        <p:nvSpPr>
-          <p:cNvPr id="3" name="Footer Placeholder 2"/>
-          <p:cNvSpPr>
-            <a:spLocks noGrp="1"/>
-          </p:cNvSpPr>
-          <p:nvPr>
-            <p:ph type="ftr" sz="quarter" idx="15"/>
-          </p:nvPr>
-        </p:nvSpPr>
-        <p:spPr>
-          <a:xfrm>
-            <a:off x="7416801" y="3562453"/>
-            <a:ext cx="1547813" cy="521465"/>
-          </a:xfrm>
-        </p:spPr>
-        <p:txBody>
-          <a:bodyPr/>
-          <a:lstStyle/>
-          <a:p>
-            <a:r>
-              <a:rPr lang="en-US" dirty="0"/>
-              <a:t>Presentation Title</a:t>
-            </a:r>
-          </a:p>
-        </p:txBody>
-      </p:sp>
       <p:pic>
         <p:nvPicPr>
-          <p:cNvPr id="4" name="Grafik 3">
+          <p:cNvPr id="3" name="Grafik 2">
             <a:extLst>
               <a:ext uri="{FF2B5EF4-FFF2-40B4-BE49-F238E27FC236}">
-                <a16:creationId xmlns:a16="http://schemas.microsoft.com/office/drawing/2014/main" id="{03B4D40F-FC9C-4CC5-8512-DA87FD8F430E}"/>
+                <a16:creationId xmlns:a16="http://schemas.microsoft.com/office/drawing/2014/main" id="{4BDF8568-DD89-441A-92BA-3F77BFE8A27A}"/>
               </a:ext>
             </a:extLst>
           </p:cNvPr>
@@ -13385,15 +16978,15 @@
           <p:nvPr/>
         </p:nvPicPr>
         <p:blipFill>
-          <a:blip r:embed="rId3"/>
+          <a:blip r:embed="rId2"/>
           <a:stretch>
             <a:fillRect/>
           </a:stretch>
         </p:blipFill>
         <p:spPr>
           <a:xfrm>
-            <a:off x="179386" y="1977401"/>
-            <a:ext cx="7217222" cy="2856084"/>
+            <a:off x="3707904" y="1563638"/>
+            <a:ext cx="3455915" cy="2457131"/>
           </a:xfrm>
           <a:prstGeom prst="rect">
             <a:avLst/>
@@ -13403,7 +16996,7 @@
     </p:spTree>
     <p:extLst>
       <p:ext uri="{BB962C8B-B14F-4D97-AF65-F5344CB8AC3E}">
-        <p14:creationId xmlns:p14="http://schemas.microsoft.com/office/powerpoint/2010/main" val="1623418179"/>
+        <p14:creationId xmlns:p14="http://schemas.microsoft.com/office/powerpoint/2010/main" val="71393694"/>
       </p:ext>
     </p:extLst>
   </p:cSld>
@@ -13435,7 +17028,56 @@
       </p:grpSpPr>
       <p:sp>
         <p:nvSpPr>
-          <p:cNvPr id="6157" name="Title 6156"/>
+          <p:cNvPr id="8" name="Textplatzhalter 7"/>
+          <p:cNvSpPr>
+            <a:spLocks noGrp="1"/>
+          </p:cNvSpPr>
+          <p:nvPr>
+            <p:ph type="body" sz="quarter" idx="13"/>
+          </p:nvPr>
+        </p:nvSpPr>
+        <p:spPr/>
+        <p:txBody>
+          <a:bodyPr/>
+          <a:lstStyle/>
+          <a:p>
+            <a:endParaRPr lang="de-DE" dirty="0"/>
+          </a:p>
+        </p:txBody>
+      </p:sp>
+      <p:pic>
+        <p:nvPicPr>
+          <p:cNvPr id="11" name="Grafik 10">
+            <a:extLst>
+              <a:ext uri="{FF2B5EF4-FFF2-40B4-BE49-F238E27FC236}">
+                <a16:creationId xmlns:a16="http://schemas.microsoft.com/office/drawing/2014/main" id="{51B91A4A-562A-4663-AEA3-7C8EFDA7565C}"/>
+              </a:ext>
+            </a:extLst>
+          </p:cNvPr>
+          <p:cNvPicPr>
+            <a:picLocks noChangeAspect="1"/>
+          </p:cNvPicPr>
+          <p:nvPr/>
+        </p:nvPicPr>
+        <p:blipFill>
+          <a:blip r:embed="rId2"/>
+          <a:stretch>
+            <a:fillRect/>
+          </a:stretch>
+        </p:blipFill>
+        <p:spPr>
+          <a:xfrm>
+            <a:off x="2513853" y="3441407"/>
+            <a:ext cx="3601389" cy="1341594"/>
+          </a:xfrm>
+          <a:prstGeom prst="rect">
+            <a:avLst/>
+          </a:prstGeom>
+        </p:spPr>
+      </p:pic>
+      <p:sp>
+        <p:nvSpPr>
+          <p:cNvPr id="7" name="Titel 6"/>
           <p:cNvSpPr>
             <a:spLocks noGrp="1"/>
           </p:cNvSpPr>
@@ -13454,16 +17096,30 @@
           <a:lstStyle/>
           <a:p>
             <a:r>
-              <a:rPr lang="en-US" dirty="0" err="1"/>
-              <a:t>Nächste</a:t>
-            </a:r>
-            <a:r>
-              <a:rPr lang="en-US" dirty="0"/>
-              <a:t> </a:t>
-            </a:r>
-            <a:r>
-              <a:rPr lang="en-US" dirty="0" err="1"/>
-              <a:t>Schritte</a:t>
+              <a:rPr lang="de-DE" dirty="0"/>
+              <a:t>Beispiele und Statistiken</a:t>
+            </a:r>
+          </a:p>
+        </p:txBody>
+      </p:sp>
+      <p:sp>
+        <p:nvSpPr>
+          <p:cNvPr id="4" name="Datumsplatzhalter 3"/>
+          <p:cNvSpPr>
+            <a:spLocks noGrp="1"/>
+          </p:cNvSpPr>
+          <p:nvPr>
+            <p:ph type="dt" sz="half" idx="14"/>
+          </p:nvPr>
+        </p:nvSpPr>
+        <p:spPr/>
+        <p:txBody>
+          <a:bodyPr/>
+          <a:lstStyle/>
+          <a:p>
+            <a:r>
+              <a:rPr lang="en-US"/>
+              <a:t>Speaker, Job Description, Date if needed</a:t>
             </a:r>
             <a:endParaRPr lang="en-US" dirty="0"/>
           </a:p>
@@ -13471,35 +17127,30 @@
       </p:sp>
       <p:sp>
         <p:nvSpPr>
-          <p:cNvPr id="6158" name="Text Placeholder 6157"/>
+          <p:cNvPr id="5" name="Fußzeilenplatzhalter 4"/>
           <p:cNvSpPr>
             <a:spLocks noGrp="1"/>
           </p:cNvSpPr>
           <p:nvPr>
-            <p:ph type="body" sz="quarter" idx="13"/>
+            <p:ph type="ftr" sz="quarter" idx="15"/>
           </p:nvPr>
         </p:nvSpPr>
         <p:spPr/>
         <p:txBody>
-          <a:bodyPr>
-            <a:normAutofit/>
-          </a:bodyPr>
-          <a:lstStyle/>
-          <a:p>
-            <a:r>
-              <a:rPr lang="en-US" dirty="0" err="1"/>
-              <a:t>Daten</a:t>
-            </a:r>
-            <a:r>
-              <a:rPr lang="en-US" dirty="0"/>
-              <a:t>: </a:t>
-            </a:r>
-          </a:p>
-        </p:txBody>
-      </p:sp>
-      <p:sp>
-        <p:nvSpPr>
-          <p:cNvPr id="6163" name="Slide Number Placeholder 6162"/>
+          <a:bodyPr/>
+          <a:lstStyle/>
+          <a:p>
+            <a:r>
+              <a:rPr lang="en-US"/>
+              <a:t>Presentation Title</a:t>
+            </a:r>
+            <a:endParaRPr lang="en-US" dirty="0"/>
+          </a:p>
+        </p:txBody>
+      </p:sp>
+      <p:sp>
+        <p:nvSpPr>
+          <p:cNvPr id="6" name="Foliennummernplatzhalter 5"/>
           <p:cNvSpPr>
             <a:spLocks noGrp="1"/>
           </p:cNvSpPr>
@@ -13507,12 +17158,7 @@
             <p:ph type="sldNum" sz="quarter" idx="16"/>
           </p:nvPr>
         </p:nvSpPr>
-        <p:spPr>
-          <a:xfrm>
-            <a:off x="7416801" y="4623195"/>
-            <a:ext cx="1547813" cy="180580"/>
-          </a:xfrm>
-        </p:spPr>
+        <p:spPr/>
         <p:txBody>
           <a:bodyPr/>
           <a:lstStyle/>
@@ -13530,64 +17176,70 @@
           </a:p>
         </p:txBody>
       </p:sp>
-      <p:sp>
-        <p:nvSpPr>
-          <p:cNvPr id="2" name="Date Placeholder 1"/>
-          <p:cNvSpPr>
-            <a:spLocks noGrp="1"/>
-          </p:cNvSpPr>
-          <p:nvPr>
-            <p:ph type="dt" sz="half" idx="14"/>
-          </p:nvPr>
-        </p:nvSpPr>
+      <p:pic>
+        <p:nvPicPr>
+          <p:cNvPr id="9" name="Grafik 8">
+            <a:extLst>
+              <a:ext uri="{FF2B5EF4-FFF2-40B4-BE49-F238E27FC236}">
+                <a16:creationId xmlns:a16="http://schemas.microsoft.com/office/drawing/2014/main" id="{EB4F7DED-484A-466A-B1DD-6DADB64296C7}"/>
+              </a:ext>
+            </a:extLst>
+          </p:cNvPr>
+          <p:cNvPicPr>
+            <a:picLocks noChangeAspect="1"/>
+          </p:cNvPicPr>
+          <p:nvPr/>
+        </p:nvPicPr>
+        <p:blipFill>
+          <a:blip r:embed="rId3"/>
+          <a:stretch>
+            <a:fillRect/>
+          </a:stretch>
+        </p:blipFill>
         <p:spPr>
           <a:xfrm>
-            <a:off x="7416801" y="4155928"/>
-            <a:ext cx="1547813" cy="467268"/>
-          </a:xfrm>
+            <a:off x="2483768" y="1271057"/>
+            <a:ext cx="4260831" cy="1365403"/>
+          </a:xfrm>
+          <a:prstGeom prst="rect">
+            <a:avLst/>
+          </a:prstGeom>
         </p:spPr>
-        <p:txBody>
-          <a:bodyPr/>
-          <a:lstStyle/>
-          <a:p>
-            <a:r>
-              <a:rPr lang="en-US" dirty="0"/>
-              <a:t>Speaker, Job Description, Date if needed</a:t>
-            </a:r>
-          </a:p>
-        </p:txBody>
-      </p:sp>
-      <p:sp>
-        <p:nvSpPr>
-          <p:cNvPr id="3" name="Footer Placeholder 2"/>
-          <p:cNvSpPr>
-            <a:spLocks noGrp="1"/>
-          </p:cNvSpPr>
-          <p:nvPr>
-            <p:ph type="ftr" sz="quarter" idx="15"/>
-          </p:nvPr>
-        </p:nvSpPr>
+      </p:pic>
+      <p:pic>
+        <p:nvPicPr>
+          <p:cNvPr id="10" name="Grafik 9">
+            <a:extLst>
+              <a:ext uri="{FF2B5EF4-FFF2-40B4-BE49-F238E27FC236}">
+                <a16:creationId xmlns:a16="http://schemas.microsoft.com/office/drawing/2014/main" id="{61B0E715-963E-4C10-A5FC-371E9B084E56}"/>
+              </a:ext>
+            </a:extLst>
+          </p:cNvPr>
+          <p:cNvPicPr>
+            <a:picLocks noChangeAspect="1"/>
+          </p:cNvPicPr>
+          <p:nvPr/>
+        </p:nvPicPr>
+        <p:blipFill>
+          <a:blip r:embed="rId4"/>
+          <a:stretch>
+            <a:fillRect/>
+          </a:stretch>
+        </p:blipFill>
         <p:spPr>
           <a:xfrm>
-            <a:off x="7416801" y="3562453"/>
-            <a:ext cx="1547813" cy="521465"/>
-          </a:xfrm>
+            <a:off x="3888089" y="1908634"/>
+            <a:ext cx="5076525" cy="1990287"/>
+          </a:xfrm>
+          <a:prstGeom prst="rect">
+            <a:avLst/>
+          </a:prstGeom>
         </p:spPr>
-        <p:txBody>
-          <a:bodyPr/>
-          <a:lstStyle/>
-          <a:p>
-            <a:r>
-              <a:rPr lang="en-US" dirty="0"/>
-              <a:t>Presentation Title</a:t>
-            </a:r>
-          </a:p>
-        </p:txBody>
-      </p:sp>
+      </p:pic>
     </p:spTree>
     <p:extLst>
       <p:ext uri="{BB962C8B-B14F-4D97-AF65-F5344CB8AC3E}">
-        <p14:creationId xmlns:p14="http://schemas.microsoft.com/office/powerpoint/2010/main" val="3573956199"/>
+        <p14:creationId xmlns:p14="http://schemas.microsoft.com/office/powerpoint/2010/main" val="1657647799"/>
       </p:ext>
     </p:extLst>
   </p:cSld>
@@ -13617,21 +17269,175 @@
           <a:chExt cx="0" cy="0"/>
         </a:xfrm>
       </p:grpSpPr>
+      <p:sp>
+        <p:nvSpPr>
+          <p:cNvPr id="8" name="Textplatzhalter 7"/>
+          <p:cNvSpPr>
+            <a:spLocks noGrp="1"/>
+          </p:cNvSpPr>
+          <p:nvPr>
+            <p:ph type="body" sz="quarter" idx="13"/>
+          </p:nvPr>
+        </p:nvSpPr>
+        <p:spPr/>
+        <p:txBody>
+          <a:bodyPr/>
+          <a:lstStyle/>
+          <a:p>
+            <a:endParaRPr lang="de-DE" dirty="0"/>
+          </a:p>
+        </p:txBody>
+      </p:sp>
+      <p:sp>
+        <p:nvSpPr>
+          <p:cNvPr id="7" name="Titel 6"/>
+          <p:cNvSpPr>
+            <a:spLocks noGrp="1"/>
+          </p:cNvSpPr>
+          <p:nvPr>
+            <p:ph type="title"/>
+          </p:nvPr>
+        </p:nvSpPr>
+        <p:spPr>
+          <a:xfrm>
+            <a:off x="358776" y="108001"/>
+            <a:ext cx="6877051" cy="927588"/>
+          </a:xfrm>
+        </p:spPr>
+        <p:txBody>
+          <a:bodyPr/>
+          <a:lstStyle/>
+          <a:p>
+            <a:r>
+              <a:rPr lang="de-DE" dirty="0"/>
+              <a:t>Beispiele und Statistiken</a:t>
+            </a:r>
+          </a:p>
+        </p:txBody>
+      </p:sp>
+      <p:sp>
+        <p:nvSpPr>
+          <p:cNvPr id="4" name="Datumsplatzhalter 3"/>
+          <p:cNvSpPr>
+            <a:spLocks noGrp="1"/>
+          </p:cNvSpPr>
+          <p:nvPr>
+            <p:ph type="dt" sz="half" idx="14"/>
+          </p:nvPr>
+        </p:nvSpPr>
+        <p:spPr/>
+        <p:txBody>
+          <a:bodyPr/>
+          <a:lstStyle/>
+          <a:p>
+            <a:r>
+              <a:rPr lang="en-US"/>
+              <a:t>Speaker, Job Description, Date if needed</a:t>
+            </a:r>
+            <a:endParaRPr lang="en-US" dirty="0"/>
+          </a:p>
+        </p:txBody>
+      </p:sp>
+      <p:sp>
+        <p:nvSpPr>
+          <p:cNvPr id="5" name="Fußzeilenplatzhalter 4"/>
+          <p:cNvSpPr>
+            <a:spLocks noGrp="1"/>
+          </p:cNvSpPr>
+          <p:nvPr>
+            <p:ph type="ftr" sz="quarter" idx="15"/>
+          </p:nvPr>
+        </p:nvSpPr>
+        <p:spPr/>
+        <p:txBody>
+          <a:bodyPr/>
+          <a:lstStyle/>
+          <a:p>
+            <a:r>
+              <a:rPr lang="en-US"/>
+              <a:t>Presentation Title</a:t>
+            </a:r>
+            <a:endParaRPr lang="en-US" dirty="0"/>
+          </a:p>
+        </p:txBody>
+      </p:sp>
+      <p:sp>
+        <p:nvSpPr>
+          <p:cNvPr id="6" name="Foliennummernplatzhalter 5"/>
+          <p:cNvSpPr>
+            <a:spLocks noGrp="1"/>
+          </p:cNvSpPr>
+          <p:nvPr>
+            <p:ph type="sldNum" sz="quarter" idx="16"/>
+          </p:nvPr>
+        </p:nvSpPr>
+        <p:spPr/>
+        <p:txBody>
+          <a:bodyPr/>
+          <a:lstStyle/>
+          <a:p>
+            <a:r>
+              <a:rPr lang="en-US"/>
+              <a:t>Chart </a:t>
+            </a:r>
+            <a:fld id="{91D913BA-B0D8-4B51-9328-DFAA0B370309}" type="slidenum">
+              <a:rPr lang="en-US" b="1" smtClean="0"/>
+              <a:pPr/>
+              <a:t>9</a:t>
+            </a:fld>
+            <a:endParaRPr lang="en-US" b="1" dirty="0"/>
+          </a:p>
+        </p:txBody>
+      </p:sp>
       <p:pic>
         <p:nvPicPr>
-          <p:cNvPr id="8" name="Picture 2" descr="P:\Projekte\Hasso Plattner Institut\TEMPLATE_HPI_01_EXP\ppt\media\image3.jpg">
+          <p:cNvPr id="3" name="Grafik 2" descr="Ein Bild, das Text, sitzend, Tisch, klein enthält.&#10;&#10;Automatisch generierte Beschreibung">
             <a:extLst>
               <a:ext uri="{FF2B5EF4-FFF2-40B4-BE49-F238E27FC236}">
-                <a16:creationId xmlns:a16="http://schemas.microsoft.com/office/drawing/2014/main" id="{7A0A6E39-8A9D-4521-BBEF-C1D988FD9139}"/>
+                <a16:creationId xmlns:a16="http://schemas.microsoft.com/office/drawing/2014/main" id="{B5E71135-BEBD-4CB0-A879-1D44C7DB8319}"/>
               </a:ext>
             </a:extLst>
           </p:cNvPr>
           <p:cNvPicPr>
-            <a:picLocks noGrp="1" noChangeAspect="1" noChangeArrowheads="1"/>
+            <a:picLocks noChangeAspect="1"/>
           </p:cNvPicPr>
-          <p:nvPr>
-            <p:ph type="pic" sz="quarter" idx="10"/>
-          </p:nvPr>
+          <p:nvPr/>
+        </p:nvPicPr>
+        <p:blipFill>
+          <a:blip r:embed="rId2">
+            <a:extLst>
+              <a:ext uri="{28A0092B-C50C-407E-A947-70E740481C1C}">
+                <a14:useLocalDpi xmlns:a14="http://schemas.microsoft.com/office/drawing/2010/main" val="0"/>
+              </a:ext>
+            </a:extLst>
+          </a:blip>
+          <a:stretch>
+            <a:fillRect/>
+          </a:stretch>
+        </p:blipFill>
+        <p:spPr>
+          <a:xfrm>
+            <a:off x="3016313" y="1547390"/>
+            <a:ext cx="2340590" cy="3075806"/>
+          </a:xfrm>
+          <a:prstGeom prst="rect">
+            <a:avLst/>
+          </a:prstGeom>
+        </p:spPr>
+      </p:pic>
+      <p:pic>
+        <p:nvPicPr>
+          <p:cNvPr id="13" name="Grafik 12" descr="Ein Bild, das sitzend enthält.&#10;&#10;Automatisch generierte Beschreibung">
+            <a:extLst>
+              <a:ext uri="{FF2B5EF4-FFF2-40B4-BE49-F238E27FC236}">
+                <a16:creationId xmlns:a16="http://schemas.microsoft.com/office/drawing/2014/main" id="{DA7E4319-C772-4162-88D5-69474FD752D6}"/>
+              </a:ext>
+            </a:extLst>
+          </p:cNvPr>
+          <p:cNvPicPr>
+            <a:picLocks noChangeAspect="1"/>
+          </p:cNvPicPr>
+          <p:nvPr/>
         </p:nvPicPr>
         <p:blipFill>
           <a:blip r:embed="rId3">
@@ -13641,138 +17447,60 @@
               </a:ext>
             </a:extLst>
           </a:blip>
-          <a:srcRect l="47" r="47"/>
           <a:stretch>
             <a:fillRect/>
           </a:stretch>
         </p:blipFill>
         <p:spPr>
           <a:xfrm>
-            <a:off x="358775" y="1058863"/>
-            <a:ext cx="8605838" cy="3744912"/>
-          </a:xfrm>
+            <a:off x="358776" y="1547390"/>
+            <a:ext cx="2657537" cy="3075806"/>
+          </a:xfrm>
+          <a:prstGeom prst="rect">
+            <a:avLst/>
+          </a:prstGeom>
         </p:spPr>
       </p:pic>
-      <p:sp>
-        <p:nvSpPr>
-          <p:cNvPr id="7" name="Textplatzhalter 6"/>
-          <p:cNvSpPr>
-            <a:spLocks noGrp="1"/>
-          </p:cNvSpPr>
-          <p:nvPr>
-            <p:ph type="body" sz="quarter" idx="11"/>
-          </p:nvPr>
-        </p:nvSpPr>
-        <p:spPr/>
-        <p:txBody>
-          <a:bodyPr/>
-          <a:lstStyle/>
-          <a:p>
-            <a:endParaRPr lang="de-DE" dirty="0"/>
-          </a:p>
-        </p:txBody>
-      </p:sp>
-      <p:sp>
-        <p:nvSpPr>
-          <p:cNvPr id="21" name="Title 20"/>
-          <p:cNvSpPr>
-            <a:spLocks noGrp="1"/>
-          </p:cNvSpPr>
-          <p:nvPr>
-            <p:ph type="ctrTitle"/>
-          </p:nvPr>
-        </p:nvSpPr>
-        <p:spPr/>
-        <p:txBody>
-          <a:bodyPr/>
-          <a:lstStyle/>
-          <a:p>
-            <a:r>
-              <a:rPr lang="de-DE" dirty="0" err="1"/>
-              <a:t>Thank</a:t>
-            </a:r>
-            <a:r>
-              <a:rPr lang="de-DE" dirty="0"/>
-              <a:t> </a:t>
-            </a:r>
-            <a:r>
-              <a:rPr lang="de-DE" dirty="0" err="1"/>
-              <a:t>you</a:t>
-            </a:r>
-            <a:r>
-              <a:rPr lang="de-DE" dirty="0"/>
-              <a:t> </a:t>
-            </a:r>
-            <a:br>
-              <a:rPr lang="de-DE" dirty="0"/>
-            </a:br>
-            <a:r>
-              <a:rPr lang="de-DE" dirty="0" err="1"/>
-              <a:t>for</a:t>
-            </a:r>
-            <a:r>
-              <a:rPr lang="de-DE" dirty="0"/>
-              <a:t> </a:t>
-            </a:r>
-            <a:r>
-              <a:rPr lang="de-DE" dirty="0" err="1"/>
-              <a:t>your</a:t>
-            </a:r>
-            <a:r>
-              <a:rPr lang="de-DE" dirty="0"/>
-              <a:t> </a:t>
-            </a:r>
-            <a:r>
-              <a:rPr lang="de-DE" dirty="0" err="1"/>
-              <a:t>attention</a:t>
-            </a:r>
-            <a:r>
-              <a:rPr lang="de-DE" dirty="0"/>
-              <a:t>!</a:t>
-            </a:r>
-            <a:endParaRPr lang="en-US" dirty="0"/>
-          </a:p>
-        </p:txBody>
-      </p:sp>
-      <p:sp>
-        <p:nvSpPr>
-          <p:cNvPr id="22" name="Subtitle 21"/>
-          <p:cNvSpPr>
-            <a:spLocks noGrp="1"/>
-          </p:cNvSpPr>
-          <p:nvPr>
-            <p:ph type="subTitle" idx="1"/>
-          </p:nvPr>
-        </p:nvSpPr>
-        <p:spPr/>
-        <p:txBody>
-          <a:bodyPr/>
-          <a:lstStyle/>
-          <a:p>
-            <a:r>
-              <a:rPr lang="en-US"/>
-              <a:t>Speaker</a:t>
-            </a:r>
-          </a:p>
-          <a:p>
-            <a:r>
-              <a:rPr lang="en-US"/>
-              <a:t>Job Description</a:t>
-            </a:r>
-          </a:p>
-          <a:p>
-            <a:r>
-              <a:rPr lang="en-US"/>
-              <a:t>Institute</a:t>
-            </a:r>
-            <a:endParaRPr lang="en-US" dirty="0"/>
-          </a:p>
-        </p:txBody>
-      </p:sp>
+      <p:pic>
+        <p:nvPicPr>
+          <p:cNvPr id="15" name="Grafik 14" descr="Ein Bild, das sitzend, Tastatur, Tisch, Mann enthält.&#10;&#10;Automatisch generierte Beschreibung">
+            <a:extLst>
+              <a:ext uri="{FF2B5EF4-FFF2-40B4-BE49-F238E27FC236}">
+                <a16:creationId xmlns:a16="http://schemas.microsoft.com/office/drawing/2014/main" id="{FFCE4221-CAAE-4C56-BBCB-021389337EC8}"/>
+              </a:ext>
+            </a:extLst>
+          </p:cNvPr>
+          <p:cNvPicPr>
+            <a:picLocks noChangeAspect="1"/>
+          </p:cNvPicPr>
+          <p:nvPr/>
+        </p:nvPicPr>
+        <p:blipFill>
+          <a:blip r:embed="rId4">
+            <a:extLst>
+              <a:ext uri="{28A0092B-C50C-407E-A947-70E740481C1C}">
+                <a14:useLocalDpi xmlns:a14="http://schemas.microsoft.com/office/drawing/2010/main" val="0"/>
+              </a:ext>
+            </a:extLst>
+          </a:blip>
+          <a:stretch>
+            <a:fillRect/>
+          </a:stretch>
+        </p:blipFill>
+        <p:spPr>
+          <a:xfrm>
+            <a:off x="5356903" y="2643758"/>
+            <a:ext cx="1989203" cy="1971856"/>
+          </a:xfrm>
+          <a:prstGeom prst="rect">
+            <a:avLst/>
+          </a:prstGeom>
+        </p:spPr>
+      </p:pic>
     </p:spTree>
     <p:extLst>
       <p:ext uri="{BB962C8B-B14F-4D97-AF65-F5344CB8AC3E}">
-        <p14:creationId xmlns:p14="http://schemas.microsoft.com/office/powerpoint/2010/main" val="807357343"/>
+        <p14:creationId xmlns:p14="http://schemas.microsoft.com/office/powerpoint/2010/main" val="976645086"/>
       </p:ext>
     </p:extLst>
   </p:cSld>

</xml_diff>